<commit_message>
Add Padauk and NotoSansMyanmar fonts, working with language code
</commit_message>
<xml_diff>
--- a/py_convert/ONE_DATA/Oneida_slides.pptx
+++ b/py_convert/ONE_DATA/Oneida_slides.pptx
@@ -3,10 +3,11 @@
 <p:presentation xmlns:a="http://schemas.openxmlformats.org/drawingml/2006/main" xmlns:p="http://schemas.openxmlformats.org/presentationml/2006/main" xmlns:r="http://schemas.openxmlformats.org/officeDocument/2006/relationships" xmlns:p14="http://schemas.microsoft.com/office/powerpoint/2010/main" xmlns:p15="http://schemas.microsoft.com/office/powerpoint/2012/main" xmlns:mc="http://schemas.openxmlformats.org/markup-compatibility/2006">
   <p:sldMasterIdLst>
     <p:sldMasterId id="2147483648" r:id="rId2"/>
+    <p:sldMasterId id="2147483661" r:id="rId3"/>
   </p:sldMasterIdLst>
   <p:sldIdLst>
-    <p:sldId id="256" r:id="rId3"/>
-    <p:sldId id="257" r:id="rId4"/>
+    <p:sldId id="256" r:id="rId4"/>
+    <p:sldId id="257" r:id="rId5"/>
   </p:sldIdLst>
   <p:sldSz cx="10080625" cy="7559675"/>
   <p:notesSz cx="7772400" cy="10058400"/>
@@ -54,7 +55,7 @@
       </p:grpSpPr>
       <p:sp>
         <p:nvSpPr>
-          <p:cNvPr id="26" name="PlaceHolder 1"/>
+          <p:cNvPr id="23" name="PlaceHolder 1"/>
           <p:cNvSpPr>
             <a:spLocks noGrp="1"/>
           </p:cNvSpPr>
@@ -65,7 +66,7 @@
         <p:spPr>
           <a:xfrm>
             <a:off x="504000" y="301320"/>
-            <a:ext cx="9071640" cy="1262160"/>
+            <a:ext cx="9071280" cy="1261800"/>
           </a:xfrm>
           <a:prstGeom prst="rect">
             <a:avLst/>
@@ -83,7 +84,7 @@
       </p:sp>
       <p:sp>
         <p:nvSpPr>
-          <p:cNvPr id="27" name="PlaceHolder 2"/>
+          <p:cNvPr id="24" name="PlaceHolder 2"/>
           <p:cNvSpPr>
             <a:spLocks noGrp="1"/>
           </p:cNvSpPr>
@@ -94,37 +95,37 @@
         <p:spPr>
           <a:xfrm>
             <a:off x="504000" y="1769040"/>
-            <a:ext cx="9071640" cy="2091240"/>
-          </a:xfrm>
-          <a:prstGeom prst="rect">
-            <a:avLst/>
-          </a:prstGeom>
-        </p:spPr>
-        <p:txBody>
-          <a:bodyPr lIns="0" rIns="0" tIns="0" bIns="0">
-            <a:normAutofit/>
-          </a:bodyPr>
-          <a:p>
-            <a:endParaRPr b="0" lang="en-US" sz="3200" spc="-1" strike="noStrike">
-              <a:latin typeface="Arial"/>
-            </a:endParaRPr>
-          </a:p>
-        </p:txBody>
-      </p:sp>
-      <p:sp>
-        <p:nvSpPr>
-          <p:cNvPr id="28" name="PlaceHolder 3"/>
-          <p:cNvSpPr>
-            <a:spLocks noGrp="1"/>
-          </p:cNvSpPr>
-          <p:nvPr>
-            <p:ph type="body"/>
-          </p:nvPr>
-        </p:nvSpPr>
-        <p:spPr>
-          <a:xfrm>
-            <a:off x="504000" y="4059360"/>
-            <a:ext cx="9071640" cy="2091240"/>
+            <a:ext cx="9071280" cy="2090880"/>
+          </a:xfrm>
+          <a:prstGeom prst="rect">
+            <a:avLst/>
+          </a:prstGeom>
+        </p:spPr>
+        <p:txBody>
+          <a:bodyPr lIns="0" rIns="0" tIns="0" bIns="0">
+            <a:normAutofit/>
+          </a:bodyPr>
+          <a:p>
+            <a:endParaRPr b="0" lang="en-US" sz="3200" spc="-1" strike="noStrike">
+              <a:latin typeface="Arial"/>
+            </a:endParaRPr>
+          </a:p>
+        </p:txBody>
+      </p:sp>
+      <p:sp>
+        <p:nvSpPr>
+          <p:cNvPr id="25" name="PlaceHolder 3"/>
+          <p:cNvSpPr>
+            <a:spLocks noGrp="1"/>
+          </p:cNvSpPr>
+          <p:nvPr>
+            <p:ph type="body"/>
+          </p:nvPr>
+        </p:nvSpPr>
+        <p:spPr>
+          <a:xfrm>
+            <a:off x="504000" y="4059000"/>
+            <a:ext cx="9071280" cy="2090880"/>
           </a:xfrm>
           <a:prstGeom prst="rect">
             <a:avLst/>
@@ -165,7 +166,7 @@
       </p:grpSpPr>
       <p:sp>
         <p:nvSpPr>
-          <p:cNvPr id="29" name="PlaceHolder 1"/>
+          <p:cNvPr id="26" name="PlaceHolder 1"/>
           <p:cNvSpPr>
             <a:spLocks noGrp="1"/>
           </p:cNvSpPr>
@@ -176,7 +177,7 @@
         <p:spPr>
           <a:xfrm>
             <a:off x="504000" y="301320"/>
-            <a:ext cx="9071640" cy="1262160"/>
+            <a:ext cx="9071280" cy="1261800"/>
           </a:xfrm>
           <a:prstGeom prst="rect">
             <a:avLst/>
@@ -194,7 +195,7 @@
       </p:sp>
       <p:sp>
         <p:nvSpPr>
-          <p:cNvPr id="30" name="PlaceHolder 2"/>
+          <p:cNvPr id="27" name="PlaceHolder 2"/>
           <p:cNvSpPr>
             <a:spLocks noGrp="1"/>
           </p:cNvSpPr>
@@ -205,97 +206,97 @@
         <p:spPr>
           <a:xfrm>
             <a:off x="504000" y="1769040"/>
-            <a:ext cx="4426920" cy="2091240"/>
-          </a:xfrm>
-          <a:prstGeom prst="rect">
-            <a:avLst/>
-          </a:prstGeom>
-        </p:spPr>
-        <p:txBody>
-          <a:bodyPr lIns="0" rIns="0" tIns="0" bIns="0">
-            <a:normAutofit/>
-          </a:bodyPr>
-          <a:p>
-            <a:endParaRPr b="0" lang="en-US" sz="3200" spc="-1" strike="noStrike">
-              <a:latin typeface="Arial"/>
-            </a:endParaRPr>
-          </a:p>
-        </p:txBody>
-      </p:sp>
-      <p:sp>
-        <p:nvSpPr>
-          <p:cNvPr id="31" name="PlaceHolder 3"/>
-          <p:cNvSpPr>
-            <a:spLocks noGrp="1"/>
-          </p:cNvSpPr>
-          <p:nvPr>
-            <p:ph type="body"/>
-          </p:nvPr>
-        </p:nvSpPr>
-        <p:spPr>
-          <a:xfrm>
-            <a:off x="5152680" y="1769040"/>
-            <a:ext cx="4426920" cy="2091240"/>
-          </a:xfrm>
-          <a:prstGeom prst="rect">
-            <a:avLst/>
-          </a:prstGeom>
-        </p:spPr>
-        <p:txBody>
-          <a:bodyPr lIns="0" rIns="0" tIns="0" bIns="0">
-            <a:normAutofit/>
-          </a:bodyPr>
-          <a:p>
-            <a:endParaRPr b="0" lang="en-US" sz="3200" spc="-1" strike="noStrike">
-              <a:latin typeface="Arial"/>
-            </a:endParaRPr>
-          </a:p>
-        </p:txBody>
-      </p:sp>
-      <p:sp>
-        <p:nvSpPr>
-          <p:cNvPr id="32" name="PlaceHolder 4"/>
-          <p:cNvSpPr>
-            <a:spLocks noGrp="1"/>
-          </p:cNvSpPr>
-          <p:nvPr>
-            <p:ph type="body"/>
-          </p:nvPr>
-        </p:nvSpPr>
-        <p:spPr>
-          <a:xfrm>
-            <a:off x="5152680" y="4059360"/>
-            <a:ext cx="4426920" cy="2091240"/>
-          </a:xfrm>
-          <a:prstGeom prst="rect">
-            <a:avLst/>
-          </a:prstGeom>
-        </p:spPr>
-        <p:txBody>
-          <a:bodyPr lIns="0" rIns="0" tIns="0" bIns="0">
-            <a:normAutofit/>
-          </a:bodyPr>
-          <a:p>
-            <a:endParaRPr b="0" lang="en-US" sz="3200" spc="-1" strike="noStrike">
-              <a:latin typeface="Arial"/>
-            </a:endParaRPr>
-          </a:p>
-        </p:txBody>
-      </p:sp>
-      <p:sp>
-        <p:nvSpPr>
-          <p:cNvPr id="33" name="PlaceHolder 5"/>
-          <p:cNvSpPr>
-            <a:spLocks noGrp="1"/>
-          </p:cNvSpPr>
-          <p:nvPr>
-            <p:ph type="body"/>
-          </p:nvPr>
-        </p:nvSpPr>
-        <p:spPr>
-          <a:xfrm>
-            <a:off x="504000" y="4059360"/>
-            <a:ext cx="4426920" cy="2091240"/>
+            <a:ext cx="4426560" cy="2090880"/>
+          </a:xfrm>
+          <a:prstGeom prst="rect">
+            <a:avLst/>
+          </a:prstGeom>
+        </p:spPr>
+        <p:txBody>
+          <a:bodyPr lIns="0" rIns="0" tIns="0" bIns="0">
+            <a:normAutofit/>
+          </a:bodyPr>
+          <a:p>
+            <a:endParaRPr b="0" lang="en-US" sz="3200" spc="-1" strike="noStrike">
+              <a:latin typeface="Arial"/>
+            </a:endParaRPr>
+          </a:p>
+        </p:txBody>
+      </p:sp>
+      <p:sp>
+        <p:nvSpPr>
+          <p:cNvPr id="28" name="PlaceHolder 3"/>
+          <p:cNvSpPr>
+            <a:spLocks noGrp="1"/>
+          </p:cNvSpPr>
+          <p:nvPr>
+            <p:ph type="body"/>
+          </p:nvPr>
+        </p:nvSpPr>
+        <p:spPr>
+          <a:xfrm>
+            <a:off x="5152320" y="1769040"/>
+            <a:ext cx="4426560" cy="2090880"/>
+          </a:xfrm>
+          <a:prstGeom prst="rect">
+            <a:avLst/>
+          </a:prstGeom>
+        </p:spPr>
+        <p:txBody>
+          <a:bodyPr lIns="0" rIns="0" tIns="0" bIns="0">
+            <a:normAutofit/>
+          </a:bodyPr>
+          <a:p>
+            <a:endParaRPr b="0" lang="en-US" sz="3200" spc="-1" strike="noStrike">
+              <a:latin typeface="Arial"/>
+            </a:endParaRPr>
+          </a:p>
+        </p:txBody>
+      </p:sp>
+      <p:sp>
+        <p:nvSpPr>
+          <p:cNvPr id="29" name="PlaceHolder 4"/>
+          <p:cNvSpPr>
+            <a:spLocks noGrp="1"/>
+          </p:cNvSpPr>
+          <p:nvPr>
+            <p:ph type="body"/>
+          </p:nvPr>
+        </p:nvSpPr>
+        <p:spPr>
+          <a:xfrm>
+            <a:off x="5152320" y="4059000"/>
+            <a:ext cx="4426560" cy="2090880"/>
+          </a:xfrm>
+          <a:prstGeom prst="rect">
+            <a:avLst/>
+          </a:prstGeom>
+        </p:spPr>
+        <p:txBody>
+          <a:bodyPr lIns="0" rIns="0" tIns="0" bIns="0">
+            <a:normAutofit/>
+          </a:bodyPr>
+          <a:p>
+            <a:endParaRPr b="0" lang="en-US" sz="3200" spc="-1" strike="noStrike">
+              <a:latin typeface="Arial"/>
+            </a:endParaRPr>
+          </a:p>
+        </p:txBody>
+      </p:sp>
+      <p:sp>
+        <p:nvSpPr>
+          <p:cNvPr id="30" name="PlaceHolder 5"/>
+          <p:cNvSpPr>
+            <a:spLocks noGrp="1"/>
+          </p:cNvSpPr>
+          <p:nvPr>
+            <p:ph type="body"/>
+          </p:nvPr>
+        </p:nvSpPr>
+        <p:spPr>
+          <a:xfrm>
+            <a:off x="504000" y="4059000"/>
+            <a:ext cx="4426560" cy="2090880"/>
           </a:xfrm>
           <a:prstGeom prst="rect">
             <a:avLst/>
@@ -336,7 +337,7 @@
       </p:grpSpPr>
       <p:sp>
         <p:nvSpPr>
-          <p:cNvPr id="34" name="PlaceHolder 1"/>
+          <p:cNvPr id="31" name="PlaceHolder 1"/>
           <p:cNvSpPr>
             <a:spLocks noGrp="1"/>
           </p:cNvSpPr>
@@ -347,7 +348,7 @@
         <p:spPr>
           <a:xfrm>
             <a:off x="504000" y="301320"/>
-            <a:ext cx="9071640" cy="1262160"/>
+            <a:ext cx="9071280" cy="1261800"/>
           </a:xfrm>
           <a:prstGeom prst="rect">
             <a:avLst/>
@@ -365,7 +366,7 @@
       </p:sp>
       <p:sp>
         <p:nvSpPr>
-          <p:cNvPr id="35" name="PlaceHolder 2"/>
+          <p:cNvPr id="32" name="PlaceHolder 2"/>
           <p:cNvSpPr>
             <a:spLocks noGrp="1"/>
           </p:cNvSpPr>
@@ -376,26 +377,26 @@
         <p:spPr>
           <a:xfrm>
             <a:off x="504000" y="1769040"/>
-            <a:ext cx="2920680" cy="2091240"/>
-          </a:xfrm>
-          <a:prstGeom prst="rect">
-            <a:avLst/>
-          </a:prstGeom>
-        </p:spPr>
-        <p:txBody>
-          <a:bodyPr lIns="0" rIns="0" tIns="0" bIns="0">
-            <a:normAutofit/>
-          </a:bodyPr>
-          <a:p>
-            <a:endParaRPr b="0" lang="en-US" sz="3200" spc="-1" strike="noStrike">
-              <a:latin typeface="Arial"/>
-            </a:endParaRPr>
-          </a:p>
-        </p:txBody>
-      </p:sp>
-      <p:sp>
-        <p:nvSpPr>
-          <p:cNvPr id="36" name="PlaceHolder 3"/>
+            <a:ext cx="2920680" cy="2090880"/>
+          </a:xfrm>
+          <a:prstGeom prst="rect">
+            <a:avLst/>
+          </a:prstGeom>
+        </p:spPr>
+        <p:txBody>
+          <a:bodyPr lIns="0" rIns="0" tIns="0" bIns="0">
+            <a:normAutofit/>
+          </a:bodyPr>
+          <a:p>
+            <a:endParaRPr b="0" lang="en-US" sz="3200" spc="-1" strike="noStrike">
+              <a:latin typeface="Arial"/>
+            </a:endParaRPr>
+          </a:p>
+        </p:txBody>
+      </p:sp>
+      <p:sp>
+        <p:nvSpPr>
+          <p:cNvPr id="33" name="PlaceHolder 3"/>
           <p:cNvSpPr>
             <a:spLocks noGrp="1"/>
           </p:cNvSpPr>
@@ -406,26 +407,26 @@
         <p:spPr>
           <a:xfrm>
             <a:off x="3571200" y="1769040"/>
-            <a:ext cx="2920680" cy="2091240"/>
-          </a:xfrm>
-          <a:prstGeom prst="rect">
-            <a:avLst/>
-          </a:prstGeom>
-        </p:spPr>
-        <p:txBody>
-          <a:bodyPr lIns="0" rIns="0" tIns="0" bIns="0">
-            <a:normAutofit/>
-          </a:bodyPr>
-          <a:p>
-            <a:endParaRPr b="0" lang="en-US" sz="3200" spc="-1" strike="noStrike">
-              <a:latin typeface="Arial"/>
-            </a:endParaRPr>
-          </a:p>
-        </p:txBody>
-      </p:sp>
-      <p:sp>
-        <p:nvSpPr>
-          <p:cNvPr id="37" name="PlaceHolder 4"/>
+            <a:ext cx="2920680" cy="2090880"/>
+          </a:xfrm>
+          <a:prstGeom prst="rect">
+            <a:avLst/>
+          </a:prstGeom>
+        </p:spPr>
+        <p:txBody>
+          <a:bodyPr lIns="0" rIns="0" tIns="0" bIns="0">
+            <a:normAutofit/>
+          </a:bodyPr>
+          <a:p>
+            <a:endParaRPr b="0" lang="en-US" sz="3200" spc="-1" strike="noStrike">
+              <a:latin typeface="Arial"/>
+            </a:endParaRPr>
+          </a:p>
+        </p:txBody>
+      </p:sp>
+      <p:sp>
+        <p:nvSpPr>
+          <p:cNvPr id="34" name="PlaceHolder 4"/>
           <p:cNvSpPr>
             <a:spLocks noGrp="1"/>
           </p:cNvSpPr>
@@ -436,97 +437,634 @@
         <p:spPr>
           <a:xfrm>
             <a:off x="6638040" y="1769040"/>
-            <a:ext cx="2920680" cy="2091240"/>
-          </a:xfrm>
-          <a:prstGeom prst="rect">
-            <a:avLst/>
-          </a:prstGeom>
-        </p:spPr>
-        <p:txBody>
-          <a:bodyPr lIns="0" rIns="0" tIns="0" bIns="0">
-            <a:normAutofit/>
-          </a:bodyPr>
-          <a:p>
-            <a:endParaRPr b="0" lang="en-US" sz="3200" spc="-1" strike="noStrike">
-              <a:latin typeface="Arial"/>
-            </a:endParaRPr>
-          </a:p>
-        </p:txBody>
-      </p:sp>
-      <p:sp>
-        <p:nvSpPr>
-          <p:cNvPr id="38" name="PlaceHolder 5"/>
-          <p:cNvSpPr>
-            <a:spLocks noGrp="1"/>
-          </p:cNvSpPr>
-          <p:nvPr>
-            <p:ph type="body"/>
-          </p:nvPr>
-        </p:nvSpPr>
-        <p:spPr>
-          <a:xfrm>
-            <a:off x="6638040" y="4059360"/>
-            <a:ext cx="2920680" cy="2091240"/>
-          </a:xfrm>
-          <a:prstGeom prst="rect">
-            <a:avLst/>
-          </a:prstGeom>
-        </p:spPr>
-        <p:txBody>
-          <a:bodyPr lIns="0" rIns="0" tIns="0" bIns="0">
-            <a:normAutofit/>
-          </a:bodyPr>
-          <a:p>
-            <a:endParaRPr b="0" lang="en-US" sz="3200" spc="-1" strike="noStrike">
-              <a:latin typeface="Arial"/>
-            </a:endParaRPr>
-          </a:p>
-        </p:txBody>
-      </p:sp>
-      <p:sp>
-        <p:nvSpPr>
-          <p:cNvPr id="39" name="PlaceHolder 6"/>
-          <p:cNvSpPr>
-            <a:spLocks noGrp="1"/>
-          </p:cNvSpPr>
-          <p:nvPr>
-            <p:ph type="body"/>
-          </p:nvPr>
-        </p:nvSpPr>
-        <p:spPr>
-          <a:xfrm>
-            <a:off x="3571200" y="4059360"/>
-            <a:ext cx="2920680" cy="2091240"/>
-          </a:xfrm>
-          <a:prstGeom prst="rect">
-            <a:avLst/>
-          </a:prstGeom>
-        </p:spPr>
-        <p:txBody>
-          <a:bodyPr lIns="0" rIns="0" tIns="0" bIns="0">
-            <a:normAutofit/>
-          </a:bodyPr>
-          <a:p>
-            <a:endParaRPr b="0" lang="en-US" sz="3200" spc="-1" strike="noStrike">
-              <a:latin typeface="Arial"/>
-            </a:endParaRPr>
-          </a:p>
-        </p:txBody>
-      </p:sp>
-      <p:sp>
-        <p:nvSpPr>
-          <p:cNvPr id="40" name="PlaceHolder 7"/>
-          <p:cNvSpPr>
-            <a:spLocks noGrp="1"/>
-          </p:cNvSpPr>
-          <p:nvPr>
-            <p:ph type="body"/>
-          </p:nvPr>
-        </p:nvSpPr>
-        <p:spPr>
-          <a:xfrm>
-            <a:off x="504000" y="4059360"/>
-            <a:ext cx="2920680" cy="2091240"/>
+            <a:ext cx="2920680" cy="2090880"/>
+          </a:xfrm>
+          <a:prstGeom prst="rect">
+            <a:avLst/>
+          </a:prstGeom>
+        </p:spPr>
+        <p:txBody>
+          <a:bodyPr lIns="0" rIns="0" tIns="0" bIns="0">
+            <a:normAutofit/>
+          </a:bodyPr>
+          <a:p>
+            <a:endParaRPr b="0" lang="en-US" sz="3200" spc="-1" strike="noStrike">
+              <a:latin typeface="Arial"/>
+            </a:endParaRPr>
+          </a:p>
+        </p:txBody>
+      </p:sp>
+      <p:sp>
+        <p:nvSpPr>
+          <p:cNvPr id="35" name="PlaceHolder 5"/>
+          <p:cNvSpPr>
+            <a:spLocks noGrp="1"/>
+          </p:cNvSpPr>
+          <p:nvPr>
+            <p:ph type="body"/>
+          </p:nvPr>
+        </p:nvSpPr>
+        <p:spPr>
+          <a:xfrm>
+            <a:off x="6638040" y="4059000"/>
+            <a:ext cx="2920680" cy="2090880"/>
+          </a:xfrm>
+          <a:prstGeom prst="rect">
+            <a:avLst/>
+          </a:prstGeom>
+        </p:spPr>
+        <p:txBody>
+          <a:bodyPr lIns="0" rIns="0" tIns="0" bIns="0">
+            <a:normAutofit/>
+          </a:bodyPr>
+          <a:p>
+            <a:endParaRPr b="0" lang="en-US" sz="3200" spc="-1" strike="noStrike">
+              <a:latin typeface="Arial"/>
+            </a:endParaRPr>
+          </a:p>
+        </p:txBody>
+      </p:sp>
+      <p:sp>
+        <p:nvSpPr>
+          <p:cNvPr id="36" name="PlaceHolder 6"/>
+          <p:cNvSpPr>
+            <a:spLocks noGrp="1"/>
+          </p:cNvSpPr>
+          <p:nvPr>
+            <p:ph type="body"/>
+          </p:nvPr>
+        </p:nvSpPr>
+        <p:spPr>
+          <a:xfrm>
+            <a:off x="3571200" y="4059000"/>
+            <a:ext cx="2920680" cy="2090880"/>
+          </a:xfrm>
+          <a:prstGeom prst="rect">
+            <a:avLst/>
+          </a:prstGeom>
+        </p:spPr>
+        <p:txBody>
+          <a:bodyPr lIns="0" rIns="0" tIns="0" bIns="0">
+            <a:normAutofit/>
+          </a:bodyPr>
+          <a:p>
+            <a:endParaRPr b="0" lang="en-US" sz="3200" spc="-1" strike="noStrike">
+              <a:latin typeface="Arial"/>
+            </a:endParaRPr>
+          </a:p>
+        </p:txBody>
+      </p:sp>
+      <p:sp>
+        <p:nvSpPr>
+          <p:cNvPr id="37" name="PlaceHolder 7"/>
+          <p:cNvSpPr>
+            <a:spLocks noGrp="1"/>
+          </p:cNvSpPr>
+          <p:nvPr>
+            <p:ph type="body"/>
+          </p:nvPr>
+        </p:nvSpPr>
+        <p:spPr>
+          <a:xfrm>
+            <a:off x="504000" y="4059000"/>
+            <a:ext cx="2920680" cy="2090880"/>
+          </a:xfrm>
+          <a:prstGeom prst="rect">
+            <a:avLst/>
+          </a:prstGeom>
+        </p:spPr>
+        <p:txBody>
+          <a:bodyPr lIns="0" rIns="0" tIns="0" bIns="0">
+            <a:normAutofit/>
+          </a:bodyPr>
+          <a:p>
+            <a:endParaRPr b="0" lang="en-US" sz="3200" spc="-1" strike="noStrike">
+              <a:latin typeface="Arial"/>
+            </a:endParaRPr>
+          </a:p>
+        </p:txBody>
+      </p:sp>
+    </p:spTree>
+  </p:cSld>
+</p:sldLayout>
+</file>
+
+<file path=ppt/slideLayouts/slideLayout13.xml><?xml version="1.0" encoding="utf-8"?>
+<p:sldLayout xmlns:a="http://schemas.openxmlformats.org/drawingml/2006/main" xmlns:p="http://schemas.openxmlformats.org/presentationml/2006/main" xmlns:r="http://schemas.openxmlformats.org/officeDocument/2006/relationships" xmlns:p14="http://schemas.microsoft.com/office/powerpoint/2010/main" xmlns:p15="http://schemas.microsoft.com/office/powerpoint/2012/main" xmlns:mc="http://schemas.openxmlformats.org/markup-compatibility/2006" type="blank" preserve="1">
+  <p:cSld name="Blank Slide">
+    <p:spTree>
+      <p:nvGrpSpPr>
+        <p:cNvPr id="1" name=""/>
+        <p:cNvGrpSpPr/>
+        <p:nvPr/>
+      </p:nvGrpSpPr>
+      <p:grpSpPr>
+        <a:xfrm>
+          <a:off x="0" y="0"/>
+          <a:ext cx="0" cy="0"/>
+          <a:chOff x="0" y="0"/>
+          <a:chExt cx="0" cy="0"/>
+        </a:xfrm>
+      </p:grpSpPr>
+    </p:spTree>
+  </p:cSld>
+</p:sldLayout>
+</file>
+
+<file path=ppt/slideLayouts/slideLayout14.xml><?xml version="1.0" encoding="utf-8"?>
+<p:sldLayout xmlns:a="http://schemas.openxmlformats.org/drawingml/2006/main" xmlns:p="http://schemas.openxmlformats.org/presentationml/2006/main" xmlns:r="http://schemas.openxmlformats.org/officeDocument/2006/relationships" xmlns:p14="http://schemas.microsoft.com/office/powerpoint/2010/main" xmlns:p15="http://schemas.microsoft.com/office/powerpoint/2012/main" xmlns:mc="http://schemas.openxmlformats.org/markup-compatibility/2006" type="tx" preserve="1">
+  <p:cSld name="Title Slide">
+    <p:spTree>
+      <p:nvGrpSpPr>
+        <p:cNvPr id="1" name=""/>
+        <p:cNvGrpSpPr/>
+        <p:nvPr/>
+      </p:nvGrpSpPr>
+      <p:grpSpPr>
+        <a:xfrm>
+          <a:off x="0" y="0"/>
+          <a:ext cx="0" cy="0"/>
+          <a:chOff x="0" y="0"/>
+          <a:chExt cx="0" cy="0"/>
+        </a:xfrm>
+      </p:grpSpPr>
+      <p:sp>
+        <p:nvSpPr>
+          <p:cNvPr id="40" name="PlaceHolder 1"/>
+          <p:cNvSpPr>
+            <a:spLocks noGrp="1"/>
+          </p:cNvSpPr>
+          <p:nvPr>
+            <p:ph type="title"/>
+          </p:nvPr>
+        </p:nvSpPr>
+        <p:spPr>
+          <a:xfrm>
+            <a:off x="504000" y="301320"/>
+            <a:ext cx="9071280" cy="1261800"/>
+          </a:xfrm>
+          <a:prstGeom prst="rect">
+            <a:avLst/>
+          </a:prstGeom>
+        </p:spPr>
+        <p:txBody>
+          <a:bodyPr lIns="0" rIns="0" tIns="0" bIns="0" anchor="ctr"/>
+          <a:p>
+            <a:pPr algn="ctr"/>
+            <a:endParaRPr b="0" lang="en-US" sz="4400" spc="-1" strike="noStrike">
+              <a:latin typeface="Arial"/>
+            </a:endParaRPr>
+          </a:p>
+        </p:txBody>
+      </p:sp>
+      <p:sp>
+        <p:nvSpPr>
+          <p:cNvPr id="41" name="PlaceHolder 2"/>
+          <p:cNvSpPr>
+            <a:spLocks noGrp="1"/>
+          </p:cNvSpPr>
+          <p:nvPr>
+            <p:ph type="subTitle"/>
+          </p:nvPr>
+        </p:nvSpPr>
+        <p:spPr>
+          <a:xfrm>
+            <a:off x="504000" y="1769040"/>
+            <a:ext cx="9071280" cy="4384080"/>
+          </a:xfrm>
+          <a:prstGeom prst="rect">
+            <a:avLst/>
+          </a:prstGeom>
+        </p:spPr>
+        <p:txBody>
+          <a:bodyPr lIns="0" rIns="0" tIns="0" bIns="0" anchor="ctr"/>
+          <a:p>
+            <a:pPr algn="ctr"/>
+            <a:endParaRPr b="0" lang="en-US" sz="3200" spc="-1" strike="noStrike">
+              <a:latin typeface="Arial"/>
+            </a:endParaRPr>
+          </a:p>
+        </p:txBody>
+      </p:sp>
+    </p:spTree>
+  </p:cSld>
+</p:sldLayout>
+</file>
+
+<file path=ppt/slideLayouts/slideLayout15.xml><?xml version="1.0" encoding="utf-8"?>
+<p:sldLayout xmlns:a="http://schemas.openxmlformats.org/drawingml/2006/main" xmlns:p="http://schemas.openxmlformats.org/presentationml/2006/main" xmlns:r="http://schemas.openxmlformats.org/officeDocument/2006/relationships" xmlns:p14="http://schemas.microsoft.com/office/powerpoint/2010/main" xmlns:p15="http://schemas.microsoft.com/office/powerpoint/2012/main" xmlns:mc="http://schemas.openxmlformats.org/markup-compatibility/2006" type="obj" preserve="1">
+  <p:cSld name="Title, Content">
+    <p:spTree>
+      <p:nvGrpSpPr>
+        <p:cNvPr id="1" name=""/>
+        <p:cNvGrpSpPr/>
+        <p:nvPr/>
+      </p:nvGrpSpPr>
+      <p:grpSpPr>
+        <a:xfrm>
+          <a:off x="0" y="0"/>
+          <a:ext cx="0" cy="0"/>
+          <a:chOff x="0" y="0"/>
+          <a:chExt cx="0" cy="0"/>
+        </a:xfrm>
+      </p:grpSpPr>
+      <p:sp>
+        <p:nvSpPr>
+          <p:cNvPr id="42" name="PlaceHolder 1"/>
+          <p:cNvSpPr>
+            <a:spLocks noGrp="1"/>
+          </p:cNvSpPr>
+          <p:nvPr>
+            <p:ph type="title"/>
+          </p:nvPr>
+        </p:nvSpPr>
+        <p:spPr>
+          <a:xfrm>
+            <a:off x="504000" y="301320"/>
+            <a:ext cx="9071280" cy="1261800"/>
+          </a:xfrm>
+          <a:prstGeom prst="rect">
+            <a:avLst/>
+          </a:prstGeom>
+        </p:spPr>
+        <p:txBody>
+          <a:bodyPr lIns="0" rIns="0" tIns="0" bIns="0" anchor="ctr"/>
+          <a:p>
+            <a:pPr algn="ctr"/>
+            <a:endParaRPr b="0" lang="en-US" sz="4400" spc="-1" strike="noStrike">
+              <a:latin typeface="Arial"/>
+            </a:endParaRPr>
+          </a:p>
+        </p:txBody>
+      </p:sp>
+      <p:sp>
+        <p:nvSpPr>
+          <p:cNvPr id="43" name="PlaceHolder 2"/>
+          <p:cNvSpPr>
+            <a:spLocks noGrp="1"/>
+          </p:cNvSpPr>
+          <p:nvPr>
+            <p:ph type="body"/>
+          </p:nvPr>
+        </p:nvSpPr>
+        <p:spPr>
+          <a:xfrm>
+            <a:off x="504000" y="1769040"/>
+            <a:ext cx="9071280" cy="4384080"/>
+          </a:xfrm>
+          <a:prstGeom prst="rect">
+            <a:avLst/>
+          </a:prstGeom>
+        </p:spPr>
+        <p:txBody>
+          <a:bodyPr lIns="0" rIns="0" tIns="0" bIns="0">
+            <a:normAutofit/>
+          </a:bodyPr>
+          <a:p>
+            <a:endParaRPr b="0" lang="en-US" sz="3200" spc="-1" strike="noStrike">
+              <a:latin typeface="Arial"/>
+            </a:endParaRPr>
+          </a:p>
+        </p:txBody>
+      </p:sp>
+    </p:spTree>
+  </p:cSld>
+</p:sldLayout>
+</file>
+
+<file path=ppt/slideLayouts/slideLayout16.xml><?xml version="1.0" encoding="utf-8"?>
+<p:sldLayout xmlns:a="http://schemas.openxmlformats.org/drawingml/2006/main" xmlns:p="http://schemas.openxmlformats.org/presentationml/2006/main" xmlns:r="http://schemas.openxmlformats.org/officeDocument/2006/relationships" xmlns:p14="http://schemas.microsoft.com/office/powerpoint/2010/main" xmlns:p15="http://schemas.microsoft.com/office/powerpoint/2012/main" xmlns:mc="http://schemas.openxmlformats.org/markup-compatibility/2006" type="twoObj" preserve="1">
+  <p:cSld name="Title, 2 Content">
+    <p:spTree>
+      <p:nvGrpSpPr>
+        <p:cNvPr id="1" name=""/>
+        <p:cNvGrpSpPr/>
+        <p:nvPr/>
+      </p:nvGrpSpPr>
+      <p:grpSpPr>
+        <a:xfrm>
+          <a:off x="0" y="0"/>
+          <a:ext cx="0" cy="0"/>
+          <a:chOff x="0" y="0"/>
+          <a:chExt cx="0" cy="0"/>
+        </a:xfrm>
+      </p:grpSpPr>
+      <p:sp>
+        <p:nvSpPr>
+          <p:cNvPr id="44" name="PlaceHolder 1"/>
+          <p:cNvSpPr>
+            <a:spLocks noGrp="1"/>
+          </p:cNvSpPr>
+          <p:nvPr>
+            <p:ph type="title"/>
+          </p:nvPr>
+        </p:nvSpPr>
+        <p:spPr>
+          <a:xfrm>
+            <a:off x="504000" y="301320"/>
+            <a:ext cx="9071280" cy="1261800"/>
+          </a:xfrm>
+          <a:prstGeom prst="rect">
+            <a:avLst/>
+          </a:prstGeom>
+        </p:spPr>
+        <p:txBody>
+          <a:bodyPr lIns="0" rIns="0" tIns="0" bIns="0" anchor="ctr"/>
+          <a:p>
+            <a:pPr algn="ctr"/>
+            <a:endParaRPr b="0" lang="en-US" sz="4400" spc="-1" strike="noStrike">
+              <a:latin typeface="Arial"/>
+            </a:endParaRPr>
+          </a:p>
+        </p:txBody>
+      </p:sp>
+      <p:sp>
+        <p:nvSpPr>
+          <p:cNvPr id="45" name="PlaceHolder 2"/>
+          <p:cNvSpPr>
+            <a:spLocks noGrp="1"/>
+          </p:cNvSpPr>
+          <p:nvPr>
+            <p:ph type="body"/>
+          </p:nvPr>
+        </p:nvSpPr>
+        <p:spPr>
+          <a:xfrm>
+            <a:off x="504000" y="1769040"/>
+            <a:ext cx="4426560" cy="4384080"/>
+          </a:xfrm>
+          <a:prstGeom prst="rect">
+            <a:avLst/>
+          </a:prstGeom>
+        </p:spPr>
+        <p:txBody>
+          <a:bodyPr lIns="0" rIns="0" tIns="0" bIns="0">
+            <a:normAutofit/>
+          </a:bodyPr>
+          <a:p>
+            <a:endParaRPr b="0" lang="en-US" sz="3200" spc="-1" strike="noStrike">
+              <a:latin typeface="Arial"/>
+            </a:endParaRPr>
+          </a:p>
+        </p:txBody>
+      </p:sp>
+      <p:sp>
+        <p:nvSpPr>
+          <p:cNvPr id="46" name="PlaceHolder 3"/>
+          <p:cNvSpPr>
+            <a:spLocks noGrp="1"/>
+          </p:cNvSpPr>
+          <p:nvPr>
+            <p:ph type="body"/>
+          </p:nvPr>
+        </p:nvSpPr>
+        <p:spPr>
+          <a:xfrm>
+            <a:off x="5152320" y="1769040"/>
+            <a:ext cx="4426560" cy="4384080"/>
+          </a:xfrm>
+          <a:prstGeom prst="rect">
+            <a:avLst/>
+          </a:prstGeom>
+        </p:spPr>
+        <p:txBody>
+          <a:bodyPr lIns="0" rIns="0" tIns="0" bIns="0">
+            <a:normAutofit/>
+          </a:bodyPr>
+          <a:p>
+            <a:endParaRPr b="0" lang="en-US" sz="3200" spc="-1" strike="noStrike">
+              <a:latin typeface="Arial"/>
+            </a:endParaRPr>
+          </a:p>
+        </p:txBody>
+      </p:sp>
+    </p:spTree>
+  </p:cSld>
+</p:sldLayout>
+</file>
+
+<file path=ppt/slideLayouts/slideLayout17.xml><?xml version="1.0" encoding="utf-8"?>
+<p:sldLayout xmlns:a="http://schemas.openxmlformats.org/drawingml/2006/main" xmlns:p="http://schemas.openxmlformats.org/presentationml/2006/main" xmlns:r="http://schemas.openxmlformats.org/officeDocument/2006/relationships" xmlns:p14="http://schemas.microsoft.com/office/powerpoint/2010/main" xmlns:p15="http://schemas.microsoft.com/office/powerpoint/2012/main" xmlns:mc="http://schemas.openxmlformats.org/markup-compatibility/2006" type="titleOnly" preserve="1">
+  <p:cSld name="Title Only">
+    <p:spTree>
+      <p:nvGrpSpPr>
+        <p:cNvPr id="1" name=""/>
+        <p:cNvGrpSpPr/>
+        <p:nvPr/>
+      </p:nvGrpSpPr>
+      <p:grpSpPr>
+        <a:xfrm>
+          <a:off x="0" y="0"/>
+          <a:ext cx="0" cy="0"/>
+          <a:chOff x="0" y="0"/>
+          <a:chExt cx="0" cy="0"/>
+        </a:xfrm>
+      </p:grpSpPr>
+      <p:sp>
+        <p:nvSpPr>
+          <p:cNvPr id="47" name="PlaceHolder 1"/>
+          <p:cNvSpPr>
+            <a:spLocks noGrp="1"/>
+          </p:cNvSpPr>
+          <p:nvPr>
+            <p:ph type="title"/>
+          </p:nvPr>
+        </p:nvSpPr>
+        <p:spPr>
+          <a:xfrm>
+            <a:off x="504000" y="301320"/>
+            <a:ext cx="9071280" cy="1261800"/>
+          </a:xfrm>
+          <a:prstGeom prst="rect">
+            <a:avLst/>
+          </a:prstGeom>
+        </p:spPr>
+        <p:txBody>
+          <a:bodyPr lIns="0" rIns="0" tIns="0" bIns="0" anchor="ctr"/>
+          <a:p>
+            <a:pPr algn="ctr"/>
+            <a:endParaRPr b="0" lang="en-US" sz="4400" spc="-1" strike="noStrike">
+              <a:latin typeface="Arial"/>
+            </a:endParaRPr>
+          </a:p>
+        </p:txBody>
+      </p:sp>
+    </p:spTree>
+  </p:cSld>
+</p:sldLayout>
+</file>
+
+<file path=ppt/slideLayouts/slideLayout18.xml><?xml version="1.0" encoding="utf-8"?>
+<p:sldLayout xmlns:a="http://schemas.openxmlformats.org/drawingml/2006/main" xmlns:p="http://schemas.openxmlformats.org/presentationml/2006/main" xmlns:r="http://schemas.openxmlformats.org/officeDocument/2006/relationships" xmlns:p14="http://schemas.microsoft.com/office/powerpoint/2010/main" xmlns:p15="http://schemas.microsoft.com/office/powerpoint/2012/main" xmlns:mc="http://schemas.openxmlformats.org/markup-compatibility/2006" type="objOnly" preserve="1">
+  <p:cSld name="Centered Text">
+    <p:spTree>
+      <p:nvGrpSpPr>
+        <p:cNvPr id="1" name=""/>
+        <p:cNvGrpSpPr/>
+        <p:nvPr/>
+      </p:nvGrpSpPr>
+      <p:grpSpPr>
+        <a:xfrm>
+          <a:off x="0" y="0"/>
+          <a:ext cx="0" cy="0"/>
+          <a:chOff x="0" y="0"/>
+          <a:chExt cx="0" cy="0"/>
+        </a:xfrm>
+      </p:grpSpPr>
+      <p:sp>
+        <p:nvSpPr>
+          <p:cNvPr id="48" name="PlaceHolder 1"/>
+          <p:cNvSpPr>
+            <a:spLocks noGrp="1"/>
+          </p:cNvSpPr>
+          <p:nvPr>
+            <p:ph type="subTitle"/>
+          </p:nvPr>
+        </p:nvSpPr>
+        <p:spPr>
+          <a:xfrm>
+            <a:off x="504000" y="301320"/>
+            <a:ext cx="9071280" cy="5850360"/>
+          </a:xfrm>
+          <a:prstGeom prst="rect">
+            <a:avLst/>
+          </a:prstGeom>
+        </p:spPr>
+        <p:txBody>
+          <a:bodyPr lIns="0" rIns="0" tIns="0" bIns="0" anchor="ctr"/>
+          <a:p>
+            <a:pPr algn="ctr"/>
+            <a:endParaRPr b="0" lang="en-US" sz="3200" spc="-1" strike="noStrike">
+              <a:latin typeface="Arial"/>
+            </a:endParaRPr>
+          </a:p>
+        </p:txBody>
+      </p:sp>
+    </p:spTree>
+  </p:cSld>
+</p:sldLayout>
+</file>
+
+<file path=ppt/slideLayouts/slideLayout19.xml><?xml version="1.0" encoding="utf-8"?>
+<p:sldLayout xmlns:a="http://schemas.openxmlformats.org/drawingml/2006/main" xmlns:p="http://schemas.openxmlformats.org/presentationml/2006/main" xmlns:r="http://schemas.openxmlformats.org/officeDocument/2006/relationships" xmlns:p14="http://schemas.microsoft.com/office/powerpoint/2010/main" xmlns:p15="http://schemas.microsoft.com/office/powerpoint/2012/main" xmlns:mc="http://schemas.openxmlformats.org/markup-compatibility/2006" type="twoObjAndObj" preserve="1">
+  <p:cSld name="Title, 2 Content and Content">
+    <p:spTree>
+      <p:nvGrpSpPr>
+        <p:cNvPr id="1" name=""/>
+        <p:cNvGrpSpPr/>
+        <p:nvPr/>
+      </p:nvGrpSpPr>
+      <p:grpSpPr>
+        <a:xfrm>
+          <a:off x="0" y="0"/>
+          <a:ext cx="0" cy="0"/>
+          <a:chOff x="0" y="0"/>
+          <a:chExt cx="0" cy="0"/>
+        </a:xfrm>
+      </p:grpSpPr>
+      <p:sp>
+        <p:nvSpPr>
+          <p:cNvPr id="49" name="PlaceHolder 1"/>
+          <p:cNvSpPr>
+            <a:spLocks noGrp="1"/>
+          </p:cNvSpPr>
+          <p:nvPr>
+            <p:ph type="title"/>
+          </p:nvPr>
+        </p:nvSpPr>
+        <p:spPr>
+          <a:xfrm>
+            <a:off x="504000" y="301320"/>
+            <a:ext cx="9071280" cy="1261800"/>
+          </a:xfrm>
+          <a:prstGeom prst="rect">
+            <a:avLst/>
+          </a:prstGeom>
+        </p:spPr>
+        <p:txBody>
+          <a:bodyPr lIns="0" rIns="0" tIns="0" bIns="0" anchor="ctr"/>
+          <a:p>
+            <a:pPr algn="ctr"/>
+            <a:endParaRPr b="0" lang="en-US" sz="4400" spc="-1" strike="noStrike">
+              <a:latin typeface="Arial"/>
+            </a:endParaRPr>
+          </a:p>
+        </p:txBody>
+      </p:sp>
+      <p:sp>
+        <p:nvSpPr>
+          <p:cNvPr id="50" name="PlaceHolder 2"/>
+          <p:cNvSpPr>
+            <a:spLocks noGrp="1"/>
+          </p:cNvSpPr>
+          <p:nvPr>
+            <p:ph type="body"/>
+          </p:nvPr>
+        </p:nvSpPr>
+        <p:spPr>
+          <a:xfrm>
+            <a:off x="504000" y="1769040"/>
+            <a:ext cx="4426560" cy="2090880"/>
+          </a:xfrm>
+          <a:prstGeom prst="rect">
+            <a:avLst/>
+          </a:prstGeom>
+        </p:spPr>
+        <p:txBody>
+          <a:bodyPr lIns="0" rIns="0" tIns="0" bIns="0">
+            <a:normAutofit/>
+          </a:bodyPr>
+          <a:p>
+            <a:endParaRPr b="0" lang="en-US" sz="3200" spc="-1" strike="noStrike">
+              <a:latin typeface="Arial"/>
+            </a:endParaRPr>
+          </a:p>
+        </p:txBody>
+      </p:sp>
+      <p:sp>
+        <p:nvSpPr>
+          <p:cNvPr id="51" name="PlaceHolder 3"/>
+          <p:cNvSpPr>
+            <a:spLocks noGrp="1"/>
+          </p:cNvSpPr>
+          <p:nvPr>
+            <p:ph type="body"/>
+          </p:nvPr>
+        </p:nvSpPr>
+        <p:spPr>
+          <a:xfrm>
+            <a:off x="504000" y="4059000"/>
+            <a:ext cx="4426560" cy="2090880"/>
+          </a:xfrm>
+          <a:prstGeom prst="rect">
+            <a:avLst/>
+          </a:prstGeom>
+        </p:spPr>
+        <p:txBody>
+          <a:bodyPr lIns="0" rIns="0" tIns="0" bIns="0">
+            <a:normAutofit/>
+          </a:bodyPr>
+          <a:p>
+            <a:endParaRPr b="0" lang="en-US" sz="3200" spc="-1" strike="noStrike">
+              <a:latin typeface="Arial"/>
+            </a:endParaRPr>
+          </a:p>
+        </p:txBody>
+      </p:sp>
+      <p:sp>
+        <p:nvSpPr>
+          <p:cNvPr id="52" name="PlaceHolder 4"/>
+          <p:cNvSpPr>
+            <a:spLocks noGrp="1"/>
+          </p:cNvSpPr>
+          <p:nvPr>
+            <p:ph type="body"/>
+          </p:nvPr>
+        </p:nvSpPr>
+        <p:spPr>
+          <a:xfrm>
+            <a:off x="5152320" y="1769040"/>
+            <a:ext cx="4426560" cy="4384080"/>
           </a:xfrm>
           <a:prstGeom prst="rect">
             <a:avLst/>
@@ -567,7 +1105,7 @@
       </p:grpSpPr>
       <p:sp>
         <p:nvSpPr>
-          <p:cNvPr id="5" name="PlaceHolder 1"/>
+          <p:cNvPr id="2" name="PlaceHolder 1"/>
           <p:cNvSpPr>
             <a:spLocks noGrp="1"/>
           </p:cNvSpPr>
@@ -578,7 +1116,7 @@
         <p:spPr>
           <a:xfrm>
             <a:off x="504000" y="301320"/>
-            <a:ext cx="9071640" cy="1262160"/>
+            <a:ext cx="9071280" cy="1261800"/>
           </a:xfrm>
           <a:prstGeom prst="rect">
             <a:avLst/>
@@ -596,7 +1134,7 @@
       </p:sp>
       <p:sp>
         <p:nvSpPr>
-          <p:cNvPr id="6" name="PlaceHolder 2"/>
+          <p:cNvPr id="3" name="PlaceHolder 2"/>
           <p:cNvSpPr>
             <a:spLocks noGrp="1"/>
           </p:cNvSpPr>
@@ -607,7 +1145,7 @@
         <p:spPr>
           <a:xfrm>
             <a:off x="504000" y="1769040"/>
-            <a:ext cx="9071640" cy="4384440"/>
+            <a:ext cx="9071280" cy="4384080"/>
           </a:xfrm>
           <a:prstGeom prst="rect">
             <a:avLst/>
@@ -617,6 +1155,801 @@
           <a:bodyPr lIns="0" rIns="0" tIns="0" bIns="0" anchor="ctr"/>
           <a:p>
             <a:pPr algn="ctr"/>
+            <a:endParaRPr b="0" lang="en-US" sz="3200" spc="-1" strike="noStrike">
+              <a:latin typeface="Arial"/>
+            </a:endParaRPr>
+          </a:p>
+        </p:txBody>
+      </p:sp>
+    </p:spTree>
+  </p:cSld>
+</p:sldLayout>
+</file>
+
+<file path=ppt/slideLayouts/slideLayout20.xml><?xml version="1.0" encoding="utf-8"?>
+<p:sldLayout xmlns:a="http://schemas.openxmlformats.org/drawingml/2006/main" xmlns:p="http://schemas.openxmlformats.org/presentationml/2006/main" xmlns:r="http://schemas.openxmlformats.org/officeDocument/2006/relationships" xmlns:p14="http://schemas.microsoft.com/office/powerpoint/2010/main" xmlns:p15="http://schemas.microsoft.com/office/powerpoint/2012/main" xmlns:mc="http://schemas.openxmlformats.org/markup-compatibility/2006" type="objAndTwoObj" preserve="1">
+  <p:cSld name="Title Content and 2 Content">
+    <p:spTree>
+      <p:nvGrpSpPr>
+        <p:cNvPr id="1" name=""/>
+        <p:cNvGrpSpPr/>
+        <p:nvPr/>
+      </p:nvGrpSpPr>
+      <p:grpSpPr>
+        <a:xfrm>
+          <a:off x="0" y="0"/>
+          <a:ext cx="0" cy="0"/>
+          <a:chOff x="0" y="0"/>
+          <a:chExt cx="0" cy="0"/>
+        </a:xfrm>
+      </p:grpSpPr>
+      <p:sp>
+        <p:nvSpPr>
+          <p:cNvPr id="53" name="PlaceHolder 1"/>
+          <p:cNvSpPr>
+            <a:spLocks noGrp="1"/>
+          </p:cNvSpPr>
+          <p:nvPr>
+            <p:ph type="title"/>
+          </p:nvPr>
+        </p:nvSpPr>
+        <p:spPr>
+          <a:xfrm>
+            <a:off x="504000" y="301320"/>
+            <a:ext cx="9071280" cy="1261800"/>
+          </a:xfrm>
+          <a:prstGeom prst="rect">
+            <a:avLst/>
+          </a:prstGeom>
+        </p:spPr>
+        <p:txBody>
+          <a:bodyPr lIns="0" rIns="0" tIns="0" bIns="0" anchor="ctr"/>
+          <a:p>
+            <a:pPr algn="ctr"/>
+            <a:endParaRPr b="0" lang="en-US" sz="4400" spc="-1" strike="noStrike">
+              <a:latin typeface="Arial"/>
+            </a:endParaRPr>
+          </a:p>
+        </p:txBody>
+      </p:sp>
+      <p:sp>
+        <p:nvSpPr>
+          <p:cNvPr id="54" name="PlaceHolder 2"/>
+          <p:cNvSpPr>
+            <a:spLocks noGrp="1"/>
+          </p:cNvSpPr>
+          <p:nvPr>
+            <p:ph type="body"/>
+          </p:nvPr>
+        </p:nvSpPr>
+        <p:spPr>
+          <a:xfrm>
+            <a:off x="504000" y="1769040"/>
+            <a:ext cx="4426560" cy="4384080"/>
+          </a:xfrm>
+          <a:prstGeom prst="rect">
+            <a:avLst/>
+          </a:prstGeom>
+        </p:spPr>
+        <p:txBody>
+          <a:bodyPr lIns="0" rIns="0" tIns="0" bIns="0">
+            <a:normAutofit/>
+          </a:bodyPr>
+          <a:p>
+            <a:endParaRPr b="0" lang="en-US" sz="3200" spc="-1" strike="noStrike">
+              <a:latin typeface="Arial"/>
+            </a:endParaRPr>
+          </a:p>
+        </p:txBody>
+      </p:sp>
+      <p:sp>
+        <p:nvSpPr>
+          <p:cNvPr id="55" name="PlaceHolder 3"/>
+          <p:cNvSpPr>
+            <a:spLocks noGrp="1"/>
+          </p:cNvSpPr>
+          <p:nvPr>
+            <p:ph type="body"/>
+          </p:nvPr>
+        </p:nvSpPr>
+        <p:spPr>
+          <a:xfrm>
+            <a:off x="5152320" y="1769040"/>
+            <a:ext cx="4426560" cy="2090880"/>
+          </a:xfrm>
+          <a:prstGeom prst="rect">
+            <a:avLst/>
+          </a:prstGeom>
+        </p:spPr>
+        <p:txBody>
+          <a:bodyPr lIns="0" rIns="0" tIns="0" bIns="0">
+            <a:normAutofit/>
+          </a:bodyPr>
+          <a:p>
+            <a:endParaRPr b="0" lang="en-US" sz="3200" spc="-1" strike="noStrike">
+              <a:latin typeface="Arial"/>
+            </a:endParaRPr>
+          </a:p>
+        </p:txBody>
+      </p:sp>
+      <p:sp>
+        <p:nvSpPr>
+          <p:cNvPr id="56" name="PlaceHolder 4"/>
+          <p:cNvSpPr>
+            <a:spLocks noGrp="1"/>
+          </p:cNvSpPr>
+          <p:nvPr>
+            <p:ph type="body"/>
+          </p:nvPr>
+        </p:nvSpPr>
+        <p:spPr>
+          <a:xfrm>
+            <a:off x="5152320" y="4059000"/>
+            <a:ext cx="4426560" cy="2090880"/>
+          </a:xfrm>
+          <a:prstGeom prst="rect">
+            <a:avLst/>
+          </a:prstGeom>
+        </p:spPr>
+        <p:txBody>
+          <a:bodyPr lIns="0" rIns="0" tIns="0" bIns="0">
+            <a:normAutofit/>
+          </a:bodyPr>
+          <a:p>
+            <a:endParaRPr b="0" lang="en-US" sz="3200" spc="-1" strike="noStrike">
+              <a:latin typeface="Arial"/>
+            </a:endParaRPr>
+          </a:p>
+        </p:txBody>
+      </p:sp>
+    </p:spTree>
+  </p:cSld>
+</p:sldLayout>
+</file>
+
+<file path=ppt/slideLayouts/slideLayout21.xml><?xml version="1.0" encoding="utf-8"?>
+<p:sldLayout xmlns:a="http://schemas.openxmlformats.org/drawingml/2006/main" xmlns:p="http://schemas.openxmlformats.org/presentationml/2006/main" xmlns:r="http://schemas.openxmlformats.org/officeDocument/2006/relationships" xmlns:p14="http://schemas.microsoft.com/office/powerpoint/2010/main" xmlns:p15="http://schemas.microsoft.com/office/powerpoint/2012/main" xmlns:mc="http://schemas.openxmlformats.org/markup-compatibility/2006" type="twoObjOverTx" preserve="1">
+  <p:cSld name="Title, 2 Content over Content">
+    <p:spTree>
+      <p:nvGrpSpPr>
+        <p:cNvPr id="1" name=""/>
+        <p:cNvGrpSpPr/>
+        <p:nvPr/>
+      </p:nvGrpSpPr>
+      <p:grpSpPr>
+        <a:xfrm>
+          <a:off x="0" y="0"/>
+          <a:ext cx="0" cy="0"/>
+          <a:chOff x="0" y="0"/>
+          <a:chExt cx="0" cy="0"/>
+        </a:xfrm>
+      </p:grpSpPr>
+      <p:sp>
+        <p:nvSpPr>
+          <p:cNvPr id="57" name="PlaceHolder 1"/>
+          <p:cNvSpPr>
+            <a:spLocks noGrp="1"/>
+          </p:cNvSpPr>
+          <p:nvPr>
+            <p:ph type="title"/>
+          </p:nvPr>
+        </p:nvSpPr>
+        <p:spPr>
+          <a:xfrm>
+            <a:off x="504000" y="301320"/>
+            <a:ext cx="9071280" cy="1261800"/>
+          </a:xfrm>
+          <a:prstGeom prst="rect">
+            <a:avLst/>
+          </a:prstGeom>
+        </p:spPr>
+        <p:txBody>
+          <a:bodyPr lIns="0" rIns="0" tIns="0" bIns="0" anchor="ctr"/>
+          <a:p>
+            <a:pPr algn="ctr"/>
+            <a:endParaRPr b="0" lang="en-US" sz="4400" spc="-1" strike="noStrike">
+              <a:latin typeface="Arial"/>
+            </a:endParaRPr>
+          </a:p>
+        </p:txBody>
+      </p:sp>
+      <p:sp>
+        <p:nvSpPr>
+          <p:cNvPr id="58" name="PlaceHolder 2"/>
+          <p:cNvSpPr>
+            <a:spLocks noGrp="1"/>
+          </p:cNvSpPr>
+          <p:nvPr>
+            <p:ph type="body"/>
+          </p:nvPr>
+        </p:nvSpPr>
+        <p:spPr>
+          <a:xfrm>
+            <a:off x="504000" y="1769040"/>
+            <a:ext cx="4426560" cy="2090880"/>
+          </a:xfrm>
+          <a:prstGeom prst="rect">
+            <a:avLst/>
+          </a:prstGeom>
+        </p:spPr>
+        <p:txBody>
+          <a:bodyPr lIns="0" rIns="0" tIns="0" bIns="0">
+            <a:normAutofit/>
+          </a:bodyPr>
+          <a:p>
+            <a:endParaRPr b="0" lang="en-US" sz="3200" spc="-1" strike="noStrike">
+              <a:latin typeface="Arial"/>
+            </a:endParaRPr>
+          </a:p>
+        </p:txBody>
+      </p:sp>
+      <p:sp>
+        <p:nvSpPr>
+          <p:cNvPr id="59" name="PlaceHolder 3"/>
+          <p:cNvSpPr>
+            <a:spLocks noGrp="1"/>
+          </p:cNvSpPr>
+          <p:nvPr>
+            <p:ph type="body"/>
+          </p:nvPr>
+        </p:nvSpPr>
+        <p:spPr>
+          <a:xfrm>
+            <a:off x="5152320" y="1769040"/>
+            <a:ext cx="4426560" cy="2090880"/>
+          </a:xfrm>
+          <a:prstGeom prst="rect">
+            <a:avLst/>
+          </a:prstGeom>
+        </p:spPr>
+        <p:txBody>
+          <a:bodyPr lIns="0" rIns="0" tIns="0" bIns="0">
+            <a:normAutofit/>
+          </a:bodyPr>
+          <a:p>
+            <a:endParaRPr b="0" lang="en-US" sz="3200" spc="-1" strike="noStrike">
+              <a:latin typeface="Arial"/>
+            </a:endParaRPr>
+          </a:p>
+        </p:txBody>
+      </p:sp>
+      <p:sp>
+        <p:nvSpPr>
+          <p:cNvPr id="60" name="PlaceHolder 4"/>
+          <p:cNvSpPr>
+            <a:spLocks noGrp="1"/>
+          </p:cNvSpPr>
+          <p:nvPr>
+            <p:ph type="body"/>
+          </p:nvPr>
+        </p:nvSpPr>
+        <p:spPr>
+          <a:xfrm>
+            <a:off x="504000" y="4059000"/>
+            <a:ext cx="9071280" cy="2090880"/>
+          </a:xfrm>
+          <a:prstGeom prst="rect">
+            <a:avLst/>
+          </a:prstGeom>
+        </p:spPr>
+        <p:txBody>
+          <a:bodyPr lIns="0" rIns="0" tIns="0" bIns="0">
+            <a:normAutofit/>
+          </a:bodyPr>
+          <a:p>
+            <a:endParaRPr b="0" lang="en-US" sz="3200" spc="-1" strike="noStrike">
+              <a:latin typeface="Arial"/>
+            </a:endParaRPr>
+          </a:p>
+        </p:txBody>
+      </p:sp>
+    </p:spTree>
+  </p:cSld>
+</p:sldLayout>
+</file>
+
+<file path=ppt/slideLayouts/slideLayout22.xml><?xml version="1.0" encoding="utf-8"?>
+<p:sldLayout xmlns:a="http://schemas.openxmlformats.org/drawingml/2006/main" xmlns:p="http://schemas.openxmlformats.org/presentationml/2006/main" xmlns:r="http://schemas.openxmlformats.org/officeDocument/2006/relationships" xmlns:p14="http://schemas.microsoft.com/office/powerpoint/2010/main" xmlns:p15="http://schemas.microsoft.com/office/powerpoint/2012/main" xmlns:mc="http://schemas.openxmlformats.org/markup-compatibility/2006" type="objOverTx" preserve="1">
+  <p:cSld name="Title, Content over Content">
+    <p:spTree>
+      <p:nvGrpSpPr>
+        <p:cNvPr id="1" name=""/>
+        <p:cNvGrpSpPr/>
+        <p:nvPr/>
+      </p:nvGrpSpPr>
+      <p:grpSpPr>
+        <a:xfrm>
+          <a:off x="0" y="0"/>
+          <a:ext cx="0" cy="0"/>
+          <a:chOff x="0" y="0"/>
+          <a:chExt cx="0" cy="0"/>
+        </a:xfrm>
+      </p:grpSpPr>
+      <p:sp>
+        <p:nvSpPr>
+          <p:cNvPr id="61" name="PlaceHolder 1"/>
+          <p:cNvSpPr>
+            <a:spLocks noGrp="1"/>
+          </p:cNvSpPr>
+          <p:nvPr>
+            <p:ph type="title"/>
+          </p:nvPr>
+        </p:nvSpPr>
+        <p:spPr>
+          <a:xfrm>
+            <a:off x="504000" y="301320"/>
+            <a:ext cx="9071280" cy="1261800"/>
+          </a:xfrm>
+          <a:prstGeom prst="rect">
+            <a:avLst/>
+          </a:prstGeom>
+        </p:spPr>
+        <p:txBody>
+          <a:bodyPr lIns="0" rIns="0" tIns="0" bIns="0" anchor="ctr"/>
+          <a:p>
+            <a:pPr algn="ctr"/>
+            <a:endParaRPr b="0" lang="en-US" sz="4400" spc="-1" strike="noStrike">
+              <a:latin typeface="Arial"/>
+            </a:endParaRPr>
+          </a:p>
+        </p:txBody>
+      </p:sp>
+      <p:sp>
+        <p:nvSpPr>
+          <p:cNvPr id="62" name="PlaceHolder 2"/>
+          <p:cNvSpPr>
+            <a:spLocks noGrp="1"/>
+          </p:cNvSpPr>
+          <p:nvPr>
+            <p:ph type="body"/>
+          </p:nvPr>
+        </p:nvSpPr>
+        <p:spPr>
+          <a:xfrm>
+            <a:off x="504000" y="1769040"/>
+            <a:ext cx="9071280" cy="2090880"/>
+          </a:xfrm>
+          <a:prstGeom prst="rect">
+            <a:avLst/>
+          </a:prstGeom>
+        </p:spPr>
+        <p:txBody>
+          <a:bodyPr lIns="0" rIns="0" tIns="0" bIns="0">
+            <a:normAutofit/>
+          </a:bodyPr>
+          <a:p>
+            <a:endParaRPr b="0" lang="en-US" sz="3200" spc="-1" strike="noStrike">
+              <a:latin typeface="Arial"/>
+            </a:endParaRPr>
+          </a:p>
+        </p:txBody>
+      </p:sp>
+      <p:sp>
+        <p:nvSpPr>
+          <p:cNvPr id="63" name="PlaceHolder 3"/>
+          <p:cNvSpPr>
+            <a:spLocks noGrp="1"/>
+          </p:cNvSpPr>
+          <p:nvPr>
+            <p:ph type="body"/>
+          </p:nvPr>
+        </p:nvSpPr>
+        <p:spPr>
+          <a:xfrm>
+            <a:off x="504000" y="4059000"/>
+            <a:ext cx="9071280" cy="2090880"/>
+          </a:xfrm>
+          <a:prstGeom prst="rect">
+            <a:avLst/>
+          </a:prstGeom>
+        </p:spPr>
+        <p:txBody>
+          <a:bodyPr lIns="0" rIns="0" tIns="0" bIns="0">
+            <a:normAutofit/>
+          </a:bodyPr>
+          <a:p>
+            <a:endParaRPr b="0" lang="en-US" sz="3200" spc="-1" strike="noStrike">
+              <a:latin typeface="Arial"/>
+            </a:endParaRPr>
+          </a:p>
+        </p:txBody>
+      </p:sp>
+    </p:spTree>
+  </p:cSld>
+</p:sldLayout>
+</file>
+
+<file path=ppt/slideLayouts/slideLayout23.xml><?xml version="1.0" encoding="utf-8"?>
+<p:sldLayout xmlns:a="http://schemas.openxmlformats.org/drawingml/2006/main" xmlns:p="http://schemas.openxmlformats.org/presentationml/2006/main" xmlns:r="http://schemas.openxmlformats.org/officeDocument/2006/relationships" xmlns:p14="http://schemas.microsoft.com/office/powerpoint/2010/main" xmlns:p15="http://schemas.microsoft.com/office/powerpoint/2012/main" xmlns:mc="http://schemas.openxmlformats.org/markup-compatibility/2006" type="fourObj" preserve="1">
+  <p:cSld name="Title, 4 Content">
+    <p:spTree>
+      <p:nvGrpSpPr>
+        <p:cNvPr id="1" name=""/>
+        <p:cNvGrpSpPr/>
+        <p:nvPr/>
+      </p:nvGrpSpPr>
+      <p:grpSpPr>
+        <a:xfrm>
+          <a:off x="0" y="0"/>
+          <a:ext cx="0" cy="0"/>
+          <a:chOff x="0" y="0"/>
+          <a:chExt cx="0" cy="0"/>
+        </a:xfrm>
+      </p:grpSpPr>
+      <p:sp>
+        <p:nvSpPr>
+          <p:cNvPr id="64" name="PlaceHolder 1"/>
+          <p:cNvSpPr>
+            <a:spLocks noGrp="1"/>
+          </p:cNvSpPr>
+          <p:nvPr>
+            <p:ph type="title"/>
+          </p:nvPr>
+        </p:nvSpPr>
+        <p:spPr>
+          <a:xfrm>
+            <a:off x="504000" y="301320"/>
+            <a:ext cx="9071280" cy="1261800"/>
+          </a:xfrm>
+          <a:prstGeom prst="rect">
+            <a:avLst/>
+          </a:prstGeom>
+        </p:spPr>
+        <p:txBody>
+          <a:bodyPr lIns="0" rIns="0" tIns="0" bIns="0" anchor="ctr"/>
+          <a:p>
+            <a:pPr algn="ctr"/>
+            <a:endParaRPr b="0" lang="en-US" sz="4400" spc="-1" strike="noStrike">
+              <a:latin typeface="Arial"/>
+            </a:endParaRPr>
+          </a:p>
+        </p:txBody>
+      </p:sp>
+      <p:sp>
+        <p:nvSpPr>
+          <p:cNvPr id="65" name="PlaceHolder 2"/>
+          <p:cNvSpPr>
+            <a:spLocks noGrp="1"/>
+          </p:cNvSpPr>
+          <p:nvPr>
+            <p:ph type="body"/>
+          </p:nvPr>
+        </p:nvSpPr>
+        <p:spPr>
+          <a:xfrm>
+            <a:off x="504000" y="1769040"/>
+            <a:ext cx="4426560" cy="2090880"/>
+          </a:xfrm>
+          <a:prstGeom prst="rect">
+            <a:avLst/>
+          </a:prstGeom>
+        </p:spPr>
+        <p:txBody>
+          <a:bodyPr lIns="0" rIns="0" tIns="0" bIns="0">
+            <a:normAutofit/>
+          </a:bodyPr>
+          <a:p>
+            <a:endParaRPr b="0" lang="en-US" sz="3200" spc="-1" strike="noStrike">
+              <a:latin typeface="Arial"/>
+            </a:endParaRPr>
+          </a:p>
+        </p:txBody>
+      </p:sp>
+      <p:sp>
+        <p:nvSpPr>
+          <p:cNvPr id="66" name="PlaceHolder 3"/>
+          <p:cNvSpPr>
+            <a:spLocks noGrp="1"/>
+          </p:cNvSpPr>
+          <p:nvPr>
+            <p:ph type="body"/>
+          </p:nvPr>
+        </p:nvSpPr>
+        <p:spPr>
+          <a:xfrm>
+            <a:off x="5152320" y="1769040"/>
+            <a:ext cx="4426560" cy="2090880"/>
+          </a:xfrm>
+          <a:prstGeom prst="rect">
+            <a:avLst/>
+          </a:prstGeom>
+        </p:spPr>
+        <p:txBody>
+          <a:bodyPr lIns="0" rIns="0" tIns="0" bIns="0">
+            <a:normAutofit/>
+          </a:bodyPr>
+          <a:p>
+            <a:endParaRPr b="0" lang="en-US" sz="3200" spc="-1" strike="noStrike">
+              <a:latin typeface="Arial"/>
+            </a:endParaRPr>
+          </a:p>
+        </p:txBody>
+      </p:sp>
+      <p:sp>
+        <p:nvSpPr>
+          <p:cNvPr id="67" name="PlaceHolder 4"/>
+          <p:cNvSpPr>
+            <a:spLocks noGrp="1"/>
+          </p:cNvSpPr>
+          <p:nvPr>
+            <p:ph type="body"/>
+          </p:nvPr>
+        </p:nvSpPr>
+        <p:spPr>
+          <a:xfrm>
+            <a:off x="5152320" y="4059000"/>
+            <a:ext cx="4426560" cy="2090880"/>
+          </a:xfrm>
+          <a:prstGeom prst="rect">
+            <a:avLst/>
+          </a:prstGeom>
+        </p:spPr>
+        <p:txBody>
+          <a:bodyPr lIns="0" rIns="0" tIns="0" bIns="0">
+            <a:normAutofit/>
+          </a:bodyPr>
+          <a:p>
+            <a:endParaRPr b="0" lang="en-US" sz="3200" spc="-1" strike="noStrike">
+              <a:latin typeface="Arial"/>
+            </a:endParaRPr>
+          </a:p>
+        </p:txBody>
+      </p:sp>
+      <p:sp>
+        <p:nvSpPr>
+          <p:cNvPr id="68" name="PlaceHolder 5"/>
+          <p:cNvSpPr>
+            <a:spLocks noGrp="1"/>
+          </p:cNvSpPr>
+          <p:nvPr>
+            <p:ph type="body"/>
+          </p:nvPr>
+        </p:nvSpPr>
+        <p:spPr>
+          <a:xfrm>
+            <a:off x="504000" y="4059000"/>
+            <a:ext cx="4426560" cy="2090880"/>
+          </a:xfrm>
+          <a:prstGeom prst="rect">
+            <a:avLst/>
+          </a:prstGeom>
+        </p:spPr>
+        <p:txBody>
+          <a:bodyPr lIns="0" rIns="0" tIns="0" bIns="0">
+            <a:normAutofit/>
+          </a:bodyPr>
+          <a:p>
+            <a:endParaRPr b="0" lang="en-US" sz="3200" spc="-1" strike="noStrike">
+              <a:latin typeface="Arial"/>
+            </a:endParaRPr>
+          </a:p>
+        </p:txBody>
+      </p:sp>
+    </p:spTree>
+  </p:cSld>
+</p:sldLayout>
+</file>
+
+<file path=ppt/slideLayouts/slideLayout24.xml><?xml version="1.0" encoding="utf-8"?>
+<p:sldLayout xmlns:a="http://schemas.openxmlformats.org/drawingml/2006/main" xmlns:p="http://schemas.openxmlformats.org/presentationml/2006/main" xmlns:r="http://schemas.openxmlformats.org/officeDocument/2006/relationships" xmlns:p14="http://schemas.microsoft.com/office/powerpoint/2010/main" xmlns:p15="http://schemas.microsoft.com/office/powerpoint/2012/main" xmlns:mc="http://schemas.openxmlformats.org/markup-compatibility/2006" type="blank" preserve="1">
+  <p:cSld name="Title, 6 Content">
+    <p:spTree>
+      <p:nvGrpSpPr>
+        <p:cNvPr id="1" name=""/>
+        <p:cNvGrpSpPr/>
+        <p:nvPr/>
+      </p:nvGrpSpPr>
+      <p:grpSpPr>
+        <a:xfrm>
+          <a:off x="0" y="0"/>
+          <a:ext cx="0" cy="0"/>
+          <a:chOff x="0" y="0"/>
+          <a:chExt cx="0" cy="0"/>
+        </a:xfrm>
+      </p:grpSpPr>
+      <p:sp>
+        <p:nvSpPr>
+          <p:cNvPr id="69" name="PlaceHolder 1"/>
+          <p:cNvSpPr>
+            <a:spLocks noGrp="1"/>
+          </p:cNvSpPr>
+          <p:nvPr>
+            <p:ph type="title"/>
+          </p:nvPr>
+        </p:nvSpPr>
+        <p:spPr>
+          <a:xfrm>
+            <a:off x="504000" y="301320"/>
+            <a:ext cx="9071280" cy="1261800"/>
+          </a:xfrm>
+          <a:prstGeom prst="rect">
+            <a:avLst/>
+          </a:prstGeom>
+        </p:spPr>
+        <p:txBody>
+          <a:bodyPr lIns="0" rIns="0" tIns="0" bIns="0" anchor="ctr"/>
+          <a:p>
+            <a:pPr algn="ctr"/>
+            <a:endParaRPr b="0" lang="en-US" sz="4400" spc="-1" strike="noStrike">
+              <a:latin typeface="Arial"/>
+            </a:endParaRPr>
+          </a:p>
+        </p:txBody>
+      </p:sp>
+      <p:sp>
+        <p:nvSpPr>
+          <p:cNvPr id="70" name="PlaceHolder 2"/>
+          <p:cNvSpPr>
+            <a:spLocks noGrp="1"/>
+          </p:cNvSpPr>
+          <p:nvPr>
+            <p:ph type="body"/>
+          </p:nvPr>
+        </p:nvSpPr>
+        <p:spPr>
+          <a:xfrm>
+            <a:off x="504000" y="1769040"/>
+            <a:ext cx="2920680" cy="2090880"/>
+          </a:xfrm>
+          <a:prstGeom prst="rect">
+            <a:avLst/>
+          </a:prstGeom>
+        </p:spPr>
+        <p:txBody>
+          <a:bodyPr lIns="0" rIns="0" tIns="0" bIns="0">
+            <a:normAutofit/>
+          </a:bodyPr>
+          <a:p>
+            <a:endParaRPr b="0" lang="en-US" sz="3200" spc="-1" strike="noStrike">
+              <a:latin typeface="Arial"/>
+            </a:endParaRPr>
+          </a:p>
+        </p:txBody>
+      </p:sp>
+      <p:sp>
+        <p:nvSpPr>
+          <p:cNvPr id="71" name="PlaceHolder 3"/>
+          <p:cNvSpPr>
+            <a:spLocks noGrp="1"/>
+          </p:cNvSpPr>
+          <p:nvPr>
+            <p:ph type="body"/>
+          </p:nvPr>
+        </p:nvSpPr>
+        <p:spPr>
+          <a:xfrm>
+            <a:off x="3571200" y="1769040"/>
+            <a:ext cx="2920680" cy="2090880"/>
+          </a:xfrm>
+          <a:prstGeom prst="rect">
+            <a:avLst/>
+          </a:prstGeom>
+        </p:spPr>
+        <p:txBody>
+          <a:bodyPr lIns="0" rIns="0" tIns="0" bIns="0">
+            <a:normAutofit/>
+          </a:bodyPr>
+          <a:p>
+            <a:endParaRPr b="0" lang="en-US" sz="3200" spc="-1" strike="noStrike">
+              <a:latin typeface="Arial"/>
+            </a:endParaRPr>
+          </a:p>
+        </p:txBody>
+      </p:sp>
+      <p:sp>
+        <p:nvSpPr>
+          <p:cNvPr id="72" name="PlaceHolder 4"/>
+          <p:cNvSpPr>
+            <a:spLocks noGrp="1"/>
+          </p:cNvSpPr>
+          <p:nvPr>
+            <p:ph type="body"/>
+          </p:nvPr>
+        </p:nvSpPr>
+        <p:spPr>
+          <a:xfrm>
+            <a:off x="6638040" y="1769040"/>
+            <a:ext cx="2920680" cy="2090880"/>
+          </a:xfrm>
+          <a:prstGeom prst="rect">
+            <a:avLst/>
+          </a:prstGeom>
+        </p:spPr>
+        <p:txBody>
+          <a:bodyPr lIns="0" rIns="0" tIns="0" bIns="0">
+            <a:normAutofit/>
+          </a:bodyPr>
+          <a:p>
+            <a:endParaRPr b="0" lang="en-US" sz="3200" spc="-1" strike="noStrike">
+              <a:latin typeface="Arial"/>
+            </a:endParaRPr>
+          </a:p>
+        </p:txBody>
+      </p:sp>
+      <p:sp>
+        <p:nvSpPr>
+          <p:cNvPr id="73" name="PlaceHolder 5"/>
+          <p:cNvSpPr>
+            <a:spLocks noGrp="1"/>
+          </p:cNvSpPr>
+          <p:nvPr>
+            <p:ph type="body"/>
+          </p:nvPr>
+        </p:nvSpPr>
+        <p:spPr>
+          <a:xfrm>
+            <a:off x="6638040" y="4059000"/>
+            <a:ext cx="2920680" cy="2090880"/>
+          </a:xfrm>
+          <a:prstGeom prst="rect">
+            <a:avLst/>
+          </a:prstGeom>
+        </p:spPr>
+        <p:txBody>
+          <a:bodyPr lIns="0" rIns="0" tIns="0" bIns="0">
+            <a:normAutofit/>
+          </a:bodyPr>
+          <a:p>
+            <a:endParaRPr b="0" lang="en-US" sz="3200" spc="-1" strike="noStrike">
+              <a:latin typeface="Arial"/>
+            </a:endParaRPr>
+          </a:p>
+        </p:txBody>
+      </p:sp>
+      <p:sp>
+        <p:nvSpPr>
+          <p:cNvPr id="74" name="PlaceHolder 6"/>
+          <p:cNvSpPr>
+            <a:spLocks noGrp="1"/>
+          </p:cNvSpPr>
+          <p:nvPr>
+            <p:ph type="body"/>
+          </p:nvPr>
+        </p:nvSpPr>
+        <p:spPr>
+          <a:xfrm>
+            <a:off x="3571200" y="4059000"/>
+            <a:ext cx="2920680" cy="2090880"/>
+          </a:xfrm>
+          <a:prstGeom prst="rect">
+            <a:avLst/>
+          </a:prstGeom>
+        </p:spPr>
+        <p:txBody>
+          <a:bodyPr lIns="0" rIns="0" tIns="0" bIns="0">
+            <a:normAutofit/>
+          </a:bodyPr>
+          <a:p>
+            <a:endParaRPr b="0" lang="en-US" sz="3200" spc="-1" strike="noStrike">
+              <a:latin typeface="Arial"/>
+            </a:endParaRPr>
+          </a:p>
+        </p:txBody>
+      </p:sp>
+      <p:sp>
+        <p:nvSpPr>
+          <p:cNvPr id="75" name="PlaceHolder 7"/>
+          <p:cNvSpPr>
+            <a:spLocks noGrp="1"/>
+          </p:cNvSpPr>
+          <p:nvPr>
+            <p:ph type="body"/>
+          </p:nvPr>
+        </p:nvSpPr>
+        <p:spPr>
+          <a:xfrm>
+            <a:off x="504000" y="4059000"/>
+            <a:ext cx="2920680" cy="2090880"/>
+          </a:xfrm>
+          <a:prstGeom prst="rect">
+            <a:avLst/>
+          </a:prstGeom>
+        </p:spPr>
+        <p:txBody>
+          <a:bodyPr lIns="0" rIns="0" tIns="0" bIns="0">
+            <a:normAutofit/>
+          </a:bodyPr>
+          <a:p>
             <a:endParaRPr b="0" lang="en-US" sz="3200" spc="-1" strike="noStrike">
               <a:latin typeface="Arial"/>
             </a:endParaRPr>
@@ -647,7 +1980,7 @@
       </p:grpSpPr>
       <p:sp>
         <p:nvSpPr>
-          <p:cNvPr id="7" name="PlaceHolder 1"/>
+          <p:cNvPr id="4" name="PlaceHolder 1"/>
           <p:cNvSpPr>
             <a:spLocks noGrp="1"/>
           </p:cNvSpPr>
@@ -658,7 +1991,7 @@
         <p:spPr>
           <a:xfrm>
             <a:off x="504000" y="301320"/>
-            <a:ext cx="9071640" cy="1262160"/>
+            <a:ext cx="9071280" cy="1261800"/>
           </a:xfrm>
           <a:prstGeom prst="rect">
             <a:avLst/>
@@ -676,7 +2009,7 @@
       </p:sp>
       <p:sp>
         <p:nvSpPr>
-          <p:cNvPr id="8" name="PlaceHolder 2"/>
+          <p:cNvPr id="5" name="PlaceHolder 2"/>
           <p:cNvSpPr>
             <a:spLocks noGrp="1"/>
           </p:cNvSpPr>
@@ -687,7 +2020,7 @@
         <p:spPr>
           <a:xfrm>
             <a:off x="504000" y="1769040"/>
-            <a:ext cx="9071640" cy="4384440"/>
+            <a:ext cx="9071280" cy="4384080"/>
           </a:xfrm>
           <a:prstGeom prst="rect">
             <a:avLst/>
@@ -728,7 +2061,7 @@
       </p:grpSpPr>
       <p:sp>
         <p:nvSpPr>
-          <p:cNvPr id="9" name="PlaceHolder 1"/>
+          <p:cNvPr id="6" name="PlaceHolder 1"/>
           <p:cNvSpPr>
             <a:spLocks noGrp="1"/>
           </p:cNvSpPr>
@@ -739,7 +2072,7 @@
         <p:spPr>
           <a:xfrm>
             <a:off x="504000" y="301320"/>
-            <a:ext cx="9071640" cy="1262160"/>
+            <a:ext cx="9071280" cy="1261800"/>
           </a:xfrm>
           <a:prstGeom prst="rect">
             <a:avLst/>
@@ -757,7 +2090,7 @@
       </p:sp>
       <p:sp>
         <p:nvSpPr>
-          <p:cNvPr id="10" name="PlaceHolder 2"/>
+          <p:cNvPr id="7" name="PlaceHolder 2"/>
           <p:cNvSpPr>
             <a:spLocks noGrp="1"/>
           </p:cNvSpPr>
@@ -768,37 +2101,37 @@
         <p:spPr>
           <a:xfrm>
             <a:off x="504000" y="1769040"/>
-            <a:ext cx="4426920" cy="4384440"/>
-          </a:xfrm>
-          <a:prstGeom prst="rect">
-            <a:avLst/>
-          </a:prstGeom>
-        </p:spPr>
-        <p:txBody>
-          <a:bodyPr lIns="0" rIns="0" tIns="0" bIns="0">
-            <a:normAutofit/>
-          </a:bodyPr>
-          <a:p>
-            <a:endParaRPr b="0" lang="en-US" sz="3200" spc="-1" strike="noStrike">
-              <a:latin typeface="Arial"/>
-            </a:endParaRPr>
-          </a:p>
-        </p:txBody>
-      </p:sp>
-      <p:sp>
-        <p:nvSpPr>
-          <p:cNvPr id="11" name="PlaceHolder 3"/>
-          <p:cNvSpPr>
-            <a:spLocks noGrp="1"/>
-          </p:cNvSpPr>
-          <p:nvPr>
-            <p:ph type="body"/>
-          </p:nvPr>
-        </p:nvSpPr>
-        <p:spPr>
-          <a:xfrm>
-            <a:off x="5152680" y="1769040"/>
-            <a:ext cx="4426920" cy="4384440"/>
+            <a:ext cx="4426560" cy="4384080"/>
+          </a:xfrm>
+          <a:prstGeom prst="rect">
+            <a:avLst/>
+          </a:prstGeom>
+        </p:spPr>
+        <p:txBody>
+          <a:bodyPr lIns="0" rIns="0" tIns="0" bIns="0">
+            <a:normAutofit/>
+          </a:bodyPr>
+          <a:p>
+            <a:endParaRPr b="0" lang="en-US" sz="3200" spc="-1" strike="noStrike">
+              <a:latin typeface="Arial"/>
+            </a:endParaRPr>
+          </a:p>
+        </p:txBody>
+      </p:sp>
+      <p:sp>
+        <p:nvSpPr>
+          <p:cNvPr id="8" name="PlaceHolder 3"/>
+          <p:cNvSpPr>
+            <a:spLocks noGrp="1"/>
+          </p:cNvSpPr>
+          <p:nvPr>
+            <p:ph type="body"/>
+          </p:nvPr>
+        </p:nvSpPr>
+        <p:spPr>
+          <a:xfrm>
+            <a:off x="5152320" y="1769040"/>
+            <a:ext cx="4426560" cy="4384080"/>
           </a:xfrm>
           <a:prstGeom prst="rect">
             <a:avLst/>
@@ -839,7 +2172,7 @@
       </p:grpSpPr>
       <p:sp>
         <p:nvSpPr>
-          <p:cNvPr id="12" name="PlaceHolder 1"/>
+          <p:cNvPr id="9" name="PlaceHolder 1"/>
           <p:cNvSpPr>
             <a:spLocks noGrp="1"/>
           </p:cNvSpPr>
@@ -850,7 +2183,7 @@
         <p:spPr>
           <a:xfrm>
             <a:off x="504000" y="301320"/>
-            <a:ext cx="9071640" cy="1262160"/>
+            <a:ext cx="9071280" cy="1261800"/>
           </a:xfrm>
           <a:prstGeom prst="rect">
             <a:avLst/>
@@ -890,7 +2223,7 @@
       </p:grpSpPr>
       <p:sp>
         <p:nvSpPr>
-          <p:cNvPr id="13" name="PlaceHolder 1"/>
+          <p:cNvPr id="10" name="PlaceHolder 1"/>
           <p:cNvSpPr>
             <a:spLocks noGrp="1"/>
           </p:cNvSpPr>
@@ -901,7 +2234,7 @@
         <p:spPr>
           <a:xfrm>
             <a:off x="504000" y="301320"/>
-            <a:ext cx="9071640" cy="5851800"/>
+            <a:ext cx="9071280" cy="5850360"/>
           </a:xfrm>
           <a:prstGeom prst="rect">
             <a:avLst/>
@@ -941,7 +2274,7 @@
       </p:grpSpPr>
       <p:sp>
         <p:nvSpPr>
-          <p:cNvPr id="14" name="PlaceHolder 1"/>
+          <p:cNvPr id="11" name="PlaceHolder 1"/>
           <p:cNvSpPr>
             <a:spLocks noGrp="1"/>
           </p:cNvSpPr>
@@ -952,7 +2285,7 @@
         <p:spPr>
           <a:xfrm>
             <a:off x="504000" y="301320"/>
-            <a:ext cx="9071640" cy="1262160"/>
+            <a:ext cx="9071280" cy="1261800"/>
           </a:xfrm>
           <a:prstGeom prst="rect">
             <a:avLst/>
@@ -970,7 +2303,7 @@
       </p:sp>
       <p:sp>
         <p:nvSpPr>
-          <p:cNvPr id="15" name="PlaceHolder 2"/>
+          <p:cNvPr id="12" name="PlaceHolder 2"/>
           <p:cNvSpPr>
             <a:spLocks noGrp="1"/>
           </p:cNvSpPr>
@@ -981,67 +2314,67 @@
         <p:spPr>
           <a:xfrm>
             <a:off x="504000" y="1769040"/>
-            <a:ext cx="4426920" cy="2091240"/>
-          </a:xfrm>
-          <a:prstGeom prst="rect">
-            <a:avLst/>
-          </a:prstGeom>
-        </p:spPr>
-        <p:txBody>
-          <a:bodyPr lIns="0" rIns="0" tIns="0" bIns="0">
-            <a:normAutofit/>
-          </a:bodyPr>
-          <a:p>
-            <a:endParaRPr b="0" lang="en-US" sz="3200" spc="-1" strike="noStrike">
-              <a:latin typeface="Arial"/>
-            </a:endParaRPr>
-          </a:p>
-        </p:txBody>
-      </p:sp>
-      <p:sp>
-        <p:nvSpPr>
-          <p:cNvPr id="16" name="PlaceHolder 3"/>
-          <p:cNvSpPr>
-            <a:spLocks noGrp="1"/>
-          </p:cNvSpPr>
-          <p:nvPr>
-            <p:ph type="body"/>
-          </p:nvPr>
-        </p:nvSpPr>
-        <p:spPr>
-          <a:xfrm>
-            <a:off x="504000" y="4059360"/>
-            <a:ext cx="4426920" cy="2091240"/>
-          </a:xfrm>
-          <a:prstGeom prst="rect">
-            <a:avLst/>
-          </a:prstGeom>
-        </p:spPr>
-        <p:txBody>
-          <a:bodyPr lIns="0" rIns="0" tIns="0" bIns="0">
-            <a:normAutofit/>
-          </a:bodyPr>
-          <a:p>
-            <a:endParaRPr b="0" lang="en-US" sz="3200" spc="-1" strike="noStrike">
-              <a:latin typeface="Arial"/>
-            </a:endParaRPr>
-          </a:p>
-        </p:txBody>
-      </p:sp>
-      <p:sp>
-        <p:nvSpPr>
-          <p:cNvPr id="17" name="PlaceHolder 4"/>
-          <p:cNvSpPr>
-            <a:spLocks noGrp="1"/>
-          </p:cNvSpPr>
-          <p:nvPr>
-            <p:ph type="body"/>
-          </p:nvPr>
-        </p:nvSpPr>
-        <p:spPr>
-          <a:xfrm>
-            <a:off x="5152680" y="1769040"/>
-            <a:ext cx="4426920" cy="4384440"/>
+            <a:ext cx="4426560" cy="2090880"/>
+          </a:xfrm>
+          <a:prstGeom prst="rect">
+            <a:avLst/>
+          </a:prstGeom>
+        </p:spPr>
+        <p:txBody>
+          <a:bodyPr lIns="0" rIns="0" tIns="0" bIns="0">
+            <a:normAutofit/>
+          </a:bodyPr>
+          <a:p>
+            <a:endParaRPr b="0" lang="en-US" sz="3200" spc="-1" strike="noStrike">
+              <a:latin typeface="Arial"/>
+            </a:endParaRPr>
+          </a:p>
+        </p:txBody>
+      </p:sp>
+      <p:sp>
+        <p:nvSpPr>
+          <p:cNvPr id="13" name="PlaceHolder 3"/>
+          <p:cNvSpPr>
+            <a:spLocks noGrp="1"/>
+          </p:cNvSpPr>
+          <p:nvPr>
+            <p:ph type="body"/>
+          </p:nvPr>
+        </p:nvSpPr>
+        <p:spPr>
+          <a:xfrm>
+            <a:off x="504000" y="4059000"/>
+            <a:ext cx="4426560" cy="2090880"/>
+          </a:xfrm>
+          <a:prstGeom prst="rect">
+            <a:avLst/>
+          </a:prstGeom>
+        </p:spPr>
+        <p:txBody>
+          <a:bodyPr lIns="0" rIns="0" tIns="0" bIns="0">
+            <a:normAutofit/>
+          </a:bodyPr>
+          <a:p>
+            <a:endParaRPr b="0" lang="en-US" sz="3200" spc="-1" strike="noStrike">
+              <a:latin typeface="Arial"/>
+            </a:endParaRPr>
+          </a:p>
+        </p:txBody>
+      </p:sp>
+      <p:sp>
+        <p:nvSpPr>
+          <p:cNvPr id="14" name="PlaceHolder 4"/>
+          <p:cNvSpPr>
+            <a:spLocks noGrp="1"/>
+          </p:cNvSpPr>
+          <p:nvPr>
+            <p:ph type="body"/>
+          </p:nvPr>
+        </p:nvSpPr>
+        <p:spPr>
+          <a:xfrm>
+            <a:off x="5152320" y="1769040"/>
+            <a:ext cx="4426560" cy="4384080"/>
           </a:xfrm>
           <a:prstGeom prst="rect">
             <a:avLst/>
@@ -1082,7 +2415,7 @@
       </p:grpSpPr>
       <p:sp>
         <p:nvSpPr>
-          <p:cNvPr id="18" name="PlaceHolder 1"/>
+          <p:cNvPr id="15" name="PlaceHolder 1"/>
           <p:cNvSpPr>
             <a:spLocks noGrp="1"/>
           </p:cNvSpPr>
@@ -1093,7 +2426,7 @@
         <p:spPr>
           <a:xfrm>
             <a:off x="504000" y="301320"/>
-            <a:ext cx="9071640" cy="1262160"/>
+            <a:ext cx="9071280" cy="1261800"/>
           </a:xfrm>
           <a:prstGeom prst="rect">
             <a:avLst/>
@@ -1111,7 +2444,7 @@
       </p:sp>
       <p:sp>
         <p:nvSpPr>
-          <p:cNvPr id="19" name="PlaceHolder 2"/>
+          <p:cNvPr id="16" name="PlaceHolder 2"/>
           <p:cNvSpPr>
             <a:spLocks noGrp="1"/>
           </p:cNvSpPr>
@@ -1122,67 +2455,67 @@
         <p:spPr>
           <a:xfrm>
             <a:off x="504000" y="1769040"/>
-            <a:ext cx="4426920" cy="4384440"/>
-          </a:xfrm>
-          <a:prstGeom prst="rect">
-            <a:avLst/>
-          </a:prstGeom>
-        </p:spPr>
-        <p:txBody>
-          <a:bodyPr lIns="0" rIns="0" tIns="0" bIns="0">
-            <a:normAutofit/>
-          </a:bodyPr>
-          <a:p>
-            <a:endParaRPr b="0" lang="en-US" sz="3200" spc="-1" strike="noStrike">
-              <a:latin typeface="Arial"/>
-            </a:endParaRPr>
-          </a:p>
-        </p:txBody>
-      </p:sp>
-      <p:sp>
-        <p:nvSpPr>
-          <p:cNvPr id="20" name="PlaceHolder 3"/>
-          <p:cNvSpPr>
-            <a:spLocks noGrp="1"/>
-          </p:cNvSpPr>
-          <p:nvPr>
-            <p:ph type="body"/>
-          </p:nvPr>
-        </p:nvSpPr>
-        <p:spPr>
-          <a:xfrm>
-            <a:off x="5152680" y="1769040"/>
-            <a:ext cx="4426920" cy="2091240"/>
-          </a:xfrm>
-          <a:prstGeom prst="rect">
-            <a:avLst/>
-          </a:prstGeom>
-        </p:spPr>
-        <p:txBody>
-          <a:bodyPr lIns="0" rIns="0" tIns="0" bIns="0">
-            <a:normAutofit/>
-          </a:bodyPr>
-          <a:p>
-            <a:endParaRPr b="0" lang="en-US" sz="3200" spc="-1" strike="noStrike">
-              <a:latin typeface="Arial"/>
-            </a:endParaRPr>
-          </a:p>
-        </p:txBody>
-      </p:sp>
-      <p:sp>
-        <p:nvSpPr>
-          <p:cNvPr id="21" name="PlaceHolder 4"/>
-          <p:cNvSpPr>
-            <a:spLocks noGrp="1"/>
-          </p:cNvSpPr>
-          <p:nvPr>
-            <p:ph type="body"/>
-          </p:nvPr>
-        </p:nvSpPr>
-        <p:spPr>
-          <a:xfrm>
-            <a:off x="5152680" y="4059360"/>
-            <a:ext cx="4426920" cy="2091240"/>
+            <a:ext cx="4426560" cy="4384080"/>
+          </a:xfrm>
+          <a:prstGeom prst="rect">
+            <a:avLst/>
+          </a:prstGeom>
+        </p:spPr>
+        <p:txBody>
+          <a:bodyPr lIns="0" rIns="0" tIns="0" bIns="0">
+            <a:normAutofit/>
+          </a:bodyPr>
+          <a:p>
+            <a:endParaRPr b="0" lang="en-US" sz="3200" spc="-1" strike="noStrike">
+              <a:latin typeface="Arial"/>
+            </a:endParaRPr>
+          </a:p>
+        </p:txBody>
+      </p:sp>
+      <p:sp>
+        <p:nvSpPr>
+          <p:cNvPr id="17" name="PlaceHolder 3"/>
+          <p:cNvSpPr>
+            <a:spLocks noGrp="1"/>
+          </p:cNvSpPr>
+          <p:nvPr>
+            <p:ph type="body"/>
+          </p:nvPr>
+        </p:nvSpPr>
+        <p:spPr>
+          <a:xfrm>
+            <a:off x="5152320" y="1769040"/>
+            <a:ext cx="4426560" cy="2090880"/>
+          </a:xfrm>
+          <a:prstGeom prst="rect">
+            <a:avLst/>
+          </a:prstGeom>
+        </p:spPr>
+        <p:txBody>
+          <a:bodyPr lIns="0" rIns="0" tIns="0" bIns="0">
+            <a:normAutofit/>
+          </a:bodyPr>
+          <a:p>
+            <a:endParaRPr b="0" lang="en-US" sz="3200" spc="-1" strike="noStrike">
+              <a:latin typeface="Arial"/>
+            </a:endParaRPr>
+          </a:p>
+        </p:txBody>
+      </p:sp>
+      <p:sp>
+        <p:nvSpPr>
+          <p:cNvPr id="18" name="PlaceHolder 4"/>
+          <p:cNvSpPr>
+            <a:spLocks noGrp="1"/>
+          </p:cNvSpPr>
+          <p:nvPr>
+            <p:ph type="body"/>
+          </p:nvPr>
+        </p:nvSpPr>
+        <p:spPr>
+          <a:xfrm>
+            <a:off x="5152320" y="4059000"/>
+            <a:ext cx="4426560" cy="2090880"/>
           </a:xfrm>
           <a:prstGeom prst="rect">
             <a:avLst/>
@@ -1223,7 +2556,7 @@
       </p:grpSpPr>
       <p:sp>
         <p:nvSpPr>
-          <p:cNvPr id="22" name="PlaceHolder 1"/>
+          <p:cNvPr id="19" name="PlaceHolder 1"/>
           <p:cNvSpPr>
             <a:spLocks noGrp="1"/>
           </p:cNvSpPr>
@@ -1234,7 +2567,7 @@
         <p:spPr>
           <a:xfrm>
             <a:off x="504000" y="301320"/>
-            <a:ext cx="9071640" cy="1262160"/>
+            <a:ext cx="9071280" cy="1261800"/>
           </a:xfrm>
           <a:prstGeom prst="rect">
             <a:avLst/>
@@ -1252,7 +2585,7 @@
       </p:sp>
       <p:sp>
         <p:nvSpPr>
-          <p:cNvPr id="23" name="PlaceHolder 2"/>
+          <p:cNvPr id="20" name="PlaceHolder 2"/>
           <p:cNvSpPr>
             <a:spLocks noGrp="1"/>
           </p:cNvSpPr>
@@ -1263,67 +2596,67 @@
         <p:spPr>
           <a:xfrm>
             <a:off x="504000" y="1769040"/>
-            <a:ext cx="4426920" cy="2091240"/>
-          </a:xfrm>
-          <a:prstGeom prst="rect">
-            <a:avLst/>
-          </a:prstGeom>
-        </p:spPr>
-        <p:txBody>
-          <a:bodyPr lIns="0" rIns="0" tIns="0" bIns="0">
-            <a:normAutofit/>
-          </a:bodyPr>
-          <a:p>
-            <a:endParaRPr b="0" lang="en-US" sz="3200" spc="-1" strike="noStrike">
-              <a:latin typeface="Arial"/>
-            </a:endParaRPr>
-          </a:p>
-        </p:txBody>
-      </p:sp>
-      <p:sp>
-        <p:nvSpPr>
-          <p:cNvPr id="24" name="PlaceHolder 3"/>
-          <p:cNvSpPr>
-            <a:spLocks noGrp="1"/>
-          </p:cNvSpPr>
-          <p:nvPr>
-            <p:ph type="body"/>
-          </p:nvPr>
-        </p:nvSpPr>
-        <p:spPr>
-          <a:xfrm>
-            <a:off x="5152680" y="1769040"/>
-            <a:ext cx="4426920" cy="2091240"/>
-          </a:xfrm>
-          <a:prstGeom prst="rect">
-            <a:avLst/>
-          </a:prstGeom>
-        </p:spPr>
-        <p:txBody>
-          <a:bodyPr lIns="0" rIns="0" tIns="0" bIns="0">
-            <a:normAutofit/>
-          </a:bodyPr>
-          <a:p>
-            <a:endParaRPr b="0" lang="en-US" sz="3200" spc="-1" strike="noStrike">
-              <a:latin typeface="Arial"/>
-            </a:endParaRPr>
-          </a:p>
-        </p:txBody>
-      </p:sp>
-      <p:sp>
-        <p:nvSpPr>
-          <p:cNvPr id="25" name="PlaceHolder 4"/>
-          <p:cNvSpPr>
-            <a:spLocks noGrp="1"/>
-          </p:cNvSpPr>
-          <p:nvPr>
-            <p:ph type="body"/>
-          </p:nvPr>
-        </p:nvSpPr>
-        <p:spPr>
-          <a:xfrm>
-            <a:off x="504000" y="4059360"/>
-            <a:ext cx="9071640" cy="2091240"/>
+            <a:ext cx="4426560" cy="2090880"/>
+          </a:xfrm>
+          <a:prstGeom prst="rect">
+            <a:avLst/>
+          </a:prstGeom>
+        </p:spPr>
+        <p:txBody>
+          <a:bodyPr lIns="0" rIns="0" tIns="0" bIns="0">
+            <a:normAutofit/>
+          </a:bodyPr>
+          <a:p>
+            <a:endParaRPr b="0" lang="en-US" sz="3200" spc="-1" strike="noStrike">
+              <a:latin typeface="Arial"/>
+            </a:endParaRPr>
+          </a:p>
+        </p:txBody>
+      </p:sp>
+      <p:sp>
+        <p:nvSpPr>
+          <p:cNvPr id="21" name="PlaceHolder 3"/>
+          <p:cNvSpPr>
+            <a:spLocks noGrp="1"/>
+          </p:cNvSpPr>
+          <p:nvPr>
+            <p:ph type="body"/>
+          </p:nvPr>
+        </p:nvSpPr>
+        <p:spPr>
+          <a:xfrm>
+            <a:off x="5152320" y="1769040"/>
+            <a:ext cx="4426560" cy="2090880"/>
+          </a:xfrm>
+          <a:prstGeom prst="rect">
+            <a:avLst/>
+          </a:prstGeom>
+        </p:spPr>
+        <p:txBody>
+          <a:bodyPr lIns="0" rIns="0" tIns="0" bIns="0">
+            <a:normAutofit/>
+          </a:bodyPr>
+          <a:p>
+            <a:endParaRPr b="0" lang="en-US" sz="3200" spc="-1" strike="noStrike">
+              <a:latin typeface="Arial"/>
+            </a:endParaRPr>
+          </a:p>
+        </p:txBody>
+      </p:sp>
+      <p:sp>
+        <p:nvSpPr>
+          <p:cNvPr id="22" name="PlaceHolder 4"/>
+          <p:cNvSpPr>
+            <a:spLocks noGrp="1"/>
+          </p:cNvSpPr>
+          <p:nvPr>
+            <p:ph type="body"/>
+          </p:nvPr>
+        </p:nvSpPr>
+        <p:spPr>
+          <a:xfrm>
+            <a:off x="504000" y="4059000"/>
+            <a:ext cx="9071280" cy="2090880"/>
           </a:xfrm>
           <a:prstGeom prst="rect">
             <a:avLst/>
@@ -1375,7 +2708,7 @@
         <p:spPr>
           <a:xfrm>
             <a:off x="504000" y="301320"/>
-            <a:ext cx="9071640" cy="1262160"/>
+            <a:ext cx="9071280" cy="1261800"/>
           </a:xfrm>
           <a:prstGeom prst="rect">
             <a:avLst/>
@@ -1384,14 +2717,13 @@
         <p:txBody>
           <a:bodyPr lIns="0" rIns="0" tIns="0" bIns="0" anchor="ctr"/>
           <a:p>
-            <a:pPr algn="ctr"/>
             <a:r>
-              <a:rPr b="0" lang="en-US" sz="4400" spc="-1" strike="noStrike">
+              <a:rPr b="0" lang="en-US" sz="1800" spc="-1" strike="noStrike">
                 <a:latin typeface="Arial"/>
               </a:rPr>
               <a:t>Click to edit the title text format</a:t>
             </a:r>
-            <a:endParaRPr b="0" lang="en-US" sz="4400" spc="-1" strike="noStrike">
+            <a:endParaRPr b="0" lang="en-US" sz="1800" spc="-1" strike="noStrike">
               <a:latin typeface="Arial"/>
             </a:endParaRPr>
           </a:p>
@@ -1409,8 +2741,8 @@
         </p:nvSpPr>
         <p:spPr>
           <a:xfrm>
-            <a:off x="504000" y="1769040"/>
-            <a:ext cx="9071640" cy="4384440"/>
+            <a:off x="504000" y="1768680"/>
+            <a:ext cx="9072000" cy="4384080"/>
           </a:xfrm>
           <a:prstGeom prst="rect">
             <a:avLst/>
@@ -1576,110 +2908,6 @@
           </a:p>
         </p:txBody>
       </p:sp>
-      <p:sp>
-        <p:nvSpPr>
-          <p:cNvPr id="2" name="PlaceHolder 3"/>
-          <p:cNvSpPr>
-            <a:spLocks noGrp="1"/>
-          </p:cNvSpPr>
-          <p:nvPr>
-            <p:ph type="dt"/>
-          </p:nvPr>
-        </p:nvSpPr>
-        <p:spPr>
-          <a:xfrm>
-            <a:off x="3447360" y="6887160"/>
-            <a:ext cx="3195000" cy="521280"/>
-          </a:xfrm>
-          <a:prstGeom prst="rect">
-            <a:avLst/>
-          </a:prstGeom>
-        </p:spPr>
-        <p:txBody>
-          <a:bodyPr lIns="0" rIns="0" tIns="0" bIns="0"/>
-          <a:p>
-            <a:r>
-              <a:rPr b="0" lang="en-US" sz="1400" spc="-1" strike="noStrike">
-                <a:latin typeface="Times New Roman"/>
-              </a:rPr>
-              <a:t>&lt;date/time&gt;</a:t>
-            </a:r>
-            <a:endParaRPr b="0" lang="en-US" sz="1400" spc="-1" strike="noStrike">
-              <a:latin typeface="Times New Roman"/>
-            </a:endParaRPr>
-          </a:p>
-        </p:txBody>
-      </p:sp>
-      <p:sp>
-        <p:nvSpPr>
-          <p:cNvPr id="3" name="PlaceHolder 4"/>
-          <p:cNvSpPr>
-            <a:spLocks noGrp="1"/>
-          </p:cNvSpPr>
-          <p:nvPr>
-            <p:ph type="ftr"/>
-          </p:nvPr>
-        </p:nvSpPr>
-        <p:spPr>
-          <a:xfrm>
-            <a:off x="7227360" y="6887160"/>
-            <a:ext cx="3195000" cy="521280"/>
-          </a:xfrm>
-          <a:prstGeom prst="rect">
-            <a:avLst/>
-          </a:prstGeom>
-        </p:spPr>
-        <p:txBody>
-          <a:bodyPr lIns="0" rIns="0" tIns="0" bIns="0"/>
-          <a:p>
-            <a:pPr algn="ctr"/>
-            <a:r>
-              <a:rPr b="0" lang="en-US" sz="1400" spc="-1" strike="noStrike">
-                <a:latin typeface="Times New Roman"/>
-              </a:rPr>
-              <a:t>&lt;footer&gt;</a:t>
-            </a:r>
-            <a:endParaRPr b="0" lang="en-US" sz="1400" spc="-1" strike="noStrike">
-              <a:latin typeface="Times New Roman"/>
-            </a:endParaRPr>
-          </a:p>
-        </p:txBody>
-      </p:sp>
-      <p:sp>
-        <p:nvSpPr>
-          <p:cNvPr id="4" name="PlaceHolder 5"/>
-          <p:cNvSpPr>
-            <a:spLocks noGrp="1"/>
-          </p:cNvSpPr>
-          <p:nvPr>
-            <p:ph type="sldNum"/>
-          </p:nvPr>
-        </p:nvSpPr>
-        <p:spPr>
-          <a:xfrm>
-            <a:off x="504000" y="6887160"/>
-            <a:ext cx="2348280" cy="521280"/>
-          </a:xfrm>
-          <a:prstGeom prst="rect">
-            <a:avLst/>
-          </a:prstGeom>
-        </p:spPr>
-        <p:txBody>
-          <a:bodyPr lIns="0" rIns="0" tIns="0" bIns="0"/>
-          <a:p>
-            <a:pPr algn="r"/>
-            <a:fld id="{0ABE434A-BBAF-46B5-AAAA-0F77F65BEA67}" type="slidenum">
-              <a:rPr b="0" lang="en-US" sz="1400" spc="-1" strike="noStrike">
-                <a:latin typeface="Times New Roman"/>
-              </a:rPr>
-              <a:t>&lt;number&gt;</a:t>
-            </a:fld>
-            <a:endParaRPr b="0" lang="en-US" sz="1400" spc="-1" strike="noStrike">
-              <a:latin typeface="Times New Roman"/>
-            </a:endParaRPr>
-          </a:p>
-        </p:txBody>
-      </p:sp>
     </p:spTree>
   </p:cSld>
   <p:clrMap bg1="lt1" bg2="lt2" tx1="dk1" tx2="dk2" accent1="accent1" accent2="accent2" accent3="accent3" accent4="accent4" accent5="accent5" accent6="accent6" hlink="hlink" folHlink="folHlink"/>
@@ -1696,6 +2924,256 @@
     <p:sldLayoutId id="2147483658" r:id="rId11"/>
     <p:sldLayoutId id="2147483659" r:id="rId12"/>
     <p:sldLayoutId id="2147483660" r:id="rId13"/>
+  </p:sldLayoutIdLst>
+</p:sldMaster>
+</file>
+
+<file path=ppt/slideMasters/slideMaster2.xml><?xml version="1.0" encoding="utf-8"?>
+<p:sldMaster xmlns:a="http://schemas.openxmlformats.org/drawingml/2006/main" xmlns:p="http://schemas.openxmlformats.org/presentationml/2006/main" xmlns:r="http://schemas.openxmlformats.org/officeDocument/2006/relationships" xmlns:p14="http://schemas.microsoft.com/office/powerpoint/2010/main" xmlns:p15="http://schemas.microsoft.com/office/powerpoint/2012/main" xmlns:mc="http://schemas.openxmlformats.org/markup-compatibility/2006">
+  <p:cSld>
+    <p:spTree>
+      <p:nvGrpSpPr>
+        <p:cNvPr id="1" name=""/>
+        <p:cNvGrpSpPr/>
+        <p:nvPr/>
+      </p:nvGrpSpPr>
+      <p:grpSpPr>
+        <a:xfrm>
+          <a:off x="0" y="0"/>
+          <a:ext cx="0" cy="0"/>
+          <a:chOff x="0" y="0"/>
+          <a:chExt cx="0" cy="0"/>
+        </a:xfrm>
+      </p:grpSpPr>
+      <p:sp>
+        <p:nvSpPr>
+          <p:cNvPr id="38" name="PlaceHolder 1"/>
+          <p:cNvSpPr>
+            <a:spLocks noGrp="1"/>
+          </p:cNvSpPr>
+          <p:nvPr>
+            <p:ph type="title"/>
+          </p:nvPr>
+        </p:nvSpPr>
+        <p:spPr>
+          <a:xfrm>
+            <a:off x="504000" y="301320"/>
+            <a:ext cx="9071280" cy="1261800"/>
+          </a:xfrm>
+          <a:prstGeom prst="rect">
+            <a:avLst/>
+          </a:prstGeom>
+        </p:spPr>
+        <p:txBody>
+          <a:bodyPr lIns="0" rIns="0" tIns="0" bIns="0" anchor="ctr"/>
+          <a:p>
+            <a:r>
+              <a:rPr b="0" lang="en-US" sz="1800" spc="-1" strike="noStrike">
+                <a:latin typeface="Arial"/>
+              </a:rPr>
+              <a:t>Click to edit the title text format</a:t>
+            </a:r>
+            <a:endParaRPr b="0" lang="en-US" sz="1800" spc="-1" strike="noStrike">
+              <a:latin typeface="Arial"/>
+            </a:endParaRPr>
+          </a:p>
+        </p:txBody>
+      </p:sp>
+      <p:sp>
+        <p:nvSpPr>
+          <p:cNvPr id="39" name="PlaceHolder 2"/>
+          <p:cNvSpPr>
+            <a:spLocks noGrp="1"/>
+          </p:cNvSpPr>
+          <p:nvPr>
+            <p:ph type="body"/>
+          </p:nvPr>
+        </p:nvSpPr>
+        <p:spPr>
+          <a:xfrm>
+            <a:off x="504000" y="1769040"/>
+            <a:ext cx="9071280" cy="4384080"/>
+          </a:xfrm>
+          <a:prstGeom prst="rect">
+            <a:avLst/>
+          </a:prstGeom>
+        </p:spPr>
+        <p:txBody>
+          <a:bodyPr lIns="0" rIns="0" tIns="0" bIns="0">
+            <a:normAutofit/>
+          </a:bodyPr>
+          <a:p>
+            <a:pPr marL="432000" indent="-324000">
+              <a:spcBef>
+                <a:spcPts val="1417"/>
+              </a:spcBef>
+              <a:buClr>
+                <a:srgbClr val="000000"/>
+              </a:buClr>
+              <a:buSzPct val="45000"/>
+              <a:buFont typeface="Wingdings" charset="2"/>
+              <a:buChar char=""/>
+            </a:pPr>
+            <a:r>
+              <a:rPr b="0" lang="en-US" sz="1800" spc="-1" strike="noStrike">
+                <a:latin typeface="Arial"/>
+              </a:rPr>
+              <a:t>Click to edit the outline text format</a:t>
+            </a:r>
+            <a:endParaRPr b="0" lang="en-US" sz="1800" spc="-1" strike="noStrike">
+              <a:latin typeface="Arial"/>
+            </a:endParaRPr>
+          </a:p>
+          <a:p>
+            <a:pPr lvl="1" marL="864000" indent="-324000">
+              <a:spcBef>
+                <a:spcPts val="1134"/>
+              </a:spcBef>
+              <a:buClr>
+                <a:srgbClr val="000000"/>
+              </a:buClr>
+              <a:buSzPct val="75000"/>
+              <a:buFont typeface="Symbol" charset="2"/>
+              <a:buChar char=""/>
+            </a:pPr>
+            <a:r>
+              <a:rPr b="0" lang="en-US" sz="1800" spc="-1" strike="noStrike">
+                <a:latin typeface="Arial"/>
+              </a:rPr>
+              <a:t>Second Outline Level</a:t>
+            </a:r>
+            <a:endParaRPr b="0" lang="en-US" sz="1800" spc="-1" strike="noStrike">
+              <a:latin typeface="Arial"/>
+            </a:endParaRPr>
+          </a:p>
+          <a:p>
+            <a:pPr lvl="2" marL="1296000" indent="-288000">
+              <a:spcBef>
+                <a:spcPts val="850"/>
+              </a:spcBef>
+              <a:buClr>
+                <a:srgbClr val="000000"/>
+              </a:buClr>
+              <a:buSzPct val="45000"/>
+              <a:buFont typeface="Wingdings" charset="2"/>
+              <a:buChar char=""/>
+            </a:pPr>
+            <a:r>
+              <a:rPr b="0" lang="en-US" sz="1800" spc="-1" strike="noStrike">
+                <a:latin typeface="Arial"/>
+              </a:rPr>
+              <a:t>Third Outline Level</a:t>
+            </a:r>
+            <a:endParaRPr b="0" lang="en-US" sz="1800" spc="-1" strike="noStrike">
+              <a:latin typeface="Arial"/>
+            </a:endParaRPr>
+          </a:p>
+          <a:p>
+            <a:pPr lvl="3" marL="1728000" indent="-216000">
+              <a:spcBef>
+                <a:spcPts val="567"/>
+              </a:spcBef>
+              <a:buClr>
+                <a:srgbClr val="000000"/>
+              </a:buClr>
+              <a:buSzPct val="75000"/>
+              <a:buFont typeface="Symbol" charset="2"/>
+              <a:buChar char=""/>
+            </a:pPr>
+            <a:r>
+              <a:rPr b="0" lang="en-US" sz="1800" spc="-1" strike="noStrike">
+                <a:latin typeface="Arial"/>
+              </a:rPr>
+              <a:t>Fourth Outline Level</a:t>
+            </a:r>
+            <a:endParaRPr b="0" lang="en-US" sz="1800" spc="-1" strike="noStrike">
+              <a:latin typeface="Arial"/>
+            </a:endParaRPr>
+          </a:p>
+          <a:p>
+            <a:pPr lvl="4" marL="2160000" indent="-216000">
+              <a:spcBef>
+                <a:spcPts val="283"/>
+              </a:spcBef>
+              <a:buClr>
+                <a:srgbClr val="000000"/>
+              </a:buClr>
+              <a:buSzPct val="45000"/>
+              <a:buFont typeface="Wingdings" charset="2"/>
+              <a:buChar char=""/>
+            </a:pPr>
+            <a:r>
+              <a:rPr b="0" lang="en-US" sz="1800" spc="-1" strike="noStrike">
+                <a:latin typeface="Arial"/>
+              </a:rPr>
+              <a:t>Fifth Outline Level</a:t>
+            </a:r>
+            <a:endParaRPr b="0" lang="en-US" sz="1800" spc="-1" strike="noStrike">
+              <a:latin typeface="Arial"/>
+            </a:endParaRPr>
+          </a:p>
+          <a:p>
+            <a:pPr lvl="5" marL="2592000" indent="-216000">
+              <a:spcBef>
+                <a:spcPts val="283"/>
+              </a:spcBef>
+              <a:buClr>
+                <a:srgbClr val="000000"/>
+              </a:buClr>
+              <a:buSzPct val="45000"/>
+              <a:buFont typeface="Wingdings" charset="2"/>
+              <a:buChar char=""/>
+            </a:pPr>
+            <a:r>
+              <a:rPr b="0" lang="en-US" sz="1800" spc="-1" strike="noStrike">
+                <a:latin typeface="Arial"/>
+              </a:rPr>
+              <a:t>Sixth Outline Level</a:t>
+            </a:r>
+            <a:endParaRPr b="0" lang="en-US" sz="1800" spc="-1" strike="noStrike">
+              <a:latin typeface="Arial"/>
+            </a:endParaRPr>
+          </a:p>
+          <a:p>
+            <a:pPr lvl="6" marL="3024000" indent="-216000">
+              <a:spcBef>
+                <a:spcPts val="283"/>
+              </a:spcBef>
+              <a:buClr>
+                <a:srgbClr val="000000"/>
+              </a:buClr>
+              <a:buSzPct val="45000"/>
+              <a:buFont typeface="Wingdings" charset="2"/>
+              <a:buChar char=""/>
+            </a:pPr>
+            <a:r>
+              <a:rPr b="0" lang="en-US" sz="1800" spc="-1" strike="noStrike">
+                <a:latin typeface="Arial"/>
+              </a:rPr>
+              <a:t>Seventh Outline Level</a:t>
+            </a:r>
+            <a:endParaRPr b="0" lang="en-US" sz="1800" spc="-1" strike="noStrike">
+              <a:latin typeface="Arial"/>
+            </a:endParaRPr>
+          </a:p>
+        </p:txBody>
+      </p:sp>
+    </p:spTree>
+  </p:cSld>
+  <p:clrMap bg1="lt1" bg2="lt2" tx1="dk1" tx2="dk2" accent1="accent1" accent2="accent2" accent3="accent3" accent4="accent4" accent5="accent5" accent6="accent6" hlink="hlink" folHlink="folHlink"/>
+  <p:sldLayoutIdLst>
+    <p:sldLayoutId id="2147483662" r:id="rId2"/>
+    <p:sldLayoutId id="2147483663" r:id="rId3"/>
+    <p:sldLayoutId id="2147483664" r:id="rId4"/>
+    <p:sldLayoutId id="2147483665" r:id="rId5"/>
+    <p:sldLayoutId id="2147483666" r:id="rId6"/>
+    <p:sldLayoutId id="2147483667" r:id="rId7"/>
+    <p:sldLayoutId id="2147483668" r:id="rId8"/>
+    <p:sldLayoutId id="2147483669" r:id="rId9"/>
+    <p:sldLayoutId id="2147483670" r:id="rId10"/>
+    <p:sldLayoutId id="2147483671" r:id="rId11"/>
+    <p:sldLayoutId id="2147483672" r:id="rId12"/>
+    <p:sldLayoutId id="2147483673" r:id="rId13"/>
   </p:sldLayoutIdLst>
 </p:sldMaster>
 </file>
@@ -1719,14 +3197,14 @@
       </p:grpSpPr>
       <p:sp>
         <p:nvSpPr>
-          <p:cNvPr id="41" name="TextShape 1"/>
-          <p:cNvSpPr txBox="1"/>
+          <p:cNvPr id="76" name="CustomShape 1"/>
+          <p:cNvSpPr/>
           <p:nvPr/>
         </p:nvSpPr>
         <p:spPr>
           <a:xfrm>
             <a:off x="504000" y="301320"/>
-            <a:ext cx="9071640" cy="1262160"/>
+            <a:ext cx="9071280" cy="1261800"/>
           </a:xfrm>
           <a:prstGeom prst="rect">
             <a:avLst/>
@@ -1736,44 +3214,58 @@
             <a:noFill/>
           </a:ln>
         </p:spPr>
+        <p:style>
+          <a:lnRef idx="0"/>
+          <a:fillRef idx="0"/>
+          <a:effectRef idx="0"/>
+          <a:fontRef idx="minor"/>
+        </p:style>
         <p:txBody>
           <a:bodyPr lIns="0" rIns="0" tIns="0" bIns="0" anchor="ctr"/>
           <a:p>
-            <a:pPr algn="ctr"/>
+            <a:pPr algn="ctr">
+              <a:lnSpc>
+                <a:spcPct val="100000"/>
+              </a:lnSpc>
+            </a:pPr>
+            <a:r>
+              <a:rPr b="1" lang="en-US" sz="5400" spc="-1" strike="noStrike">
+                <a:latin typeface="Oneida"/>
+              </a:rPr>
+              <a:t>Uk</a:t>
+            </a:r>
             <a:r>
               <a:rPr b="0" lang="en-US" sz="5400" spc="-1" strike="noStrike">
                 <a:latin typeface="Oneida"/>
               </a:rPr>
-              <a:t>Ukwehok&amp;</a:t>
+              <a:t>wehok&amp;</a:t>
             </a:r>
             <a:r>
-              <a:rPr b="0" lang="en-US" sz="5400" spc="-1" strike="noStrike" u="sng">
+              <a:rPr b="0" i="1" lang="en-US" sz="5400" spc="-1" strike="noStrike" u="sng">
                 <a:solidFill>
                   <a:srgbClr val="000000"/>
                 </a:solidFill>
                 <a:uFillTx/>
                 <a:latin typeface="Oneida"/>
-                <a:ea typeface=""/>
               </a:rPr>
               <a:t>ha</a:t>
             </a:r>
             <a:endParaRPr b="0" lang="en-US" sz="5400" spc="-1" strike="noStrike">
-              <a:latin typeface="Oneida"/>
-              <a:ea typeface="Noto Sans CJK SC Regular"/>
-            </a:endParaRPr>
-          </a:p>
-        </p:txBody>
-      </p:sp>
-      <p:sp>
-        <p:nvSpPr>
-          <p:cNvPr id="42" name="TextShape 2"/>
-          <p:cNvSpPr txBox="1"/>
+              <a:latin typeface="Arial"/>
+            </a:endParaRPr>
+          </a:p>
+        </p:txBody>
+      </p:sp>
+      <p:sp>
+        <p:nvSpPr>
+          <p:cNvPr id="77" name="CustomShape 2"/>
+          <p:cNvSpPr/>
           <p:nvPr/>
         </p:nvSpPr>
         <p:spPr>
           <a:xfrm>
             <a:off x="504000" y="1769040"/>
-            <a:ext cx="9071640" cy="4384440"/>
+            <a:ext cx="9071280" cy="4384080"/>
           </a:xfrm>
           <a:prstGeom prst="rect">
             <a:avLst/>
@@ -1783,30 +3275,26 @@
             <a:noFill/>
           </a:ln>
         </p:spPr>
+        <p:style>
+          <a:lnRef idx="0"/>
+          <a:fillRef idx="0"/>
+          <a:effectRef idx="0"/>
+          <a:fontRef idx="minor"/>
+        </p:style>
         <p:txBody>
           <a:bodyPr lIns="0" rIns="0" tIns="0" bIns="0" anchor="ctr"/>
           <a:p>
-            <a:pPr algn="ctr"/>
+            <a:pPr algn="ctr">
+              <a:lnSpc>
+                <a:spcPct val="100000"/>
+              </a:lnSpc>
+            </a:pPr>
             <a:r>
               <a:rPr b="0" i="1" lang="en-US" sz="3200" spc="-1" strike="noStrike">
                 <a:latin typeface="Oneida"/>
                 <a:ea typeface="Noto Sans CJK SC Regular"/>
               </a:rPr>
-              <a:t>Ta= </a:t>
-            </a:r>
-            <a:r>
-              <a:rPr b="0" i="1" lang="en-US" sz="3200" spc="-1" strike="noStrike">
-                <a:latin typeface="Oneida"/>
-                <a:ea typeface="Noto Sans CJK SC Regular"/>
-              </a:rPr>
-              <a:t>aeswatahuhsiy%ste&gt;</a:t>
-            </a:r>
-            <a:r>
-              <a:rPr b="0" i="1" lang="en-US" sz="3200" spc="-1" strike="noStrike">
-                <a:latin typeface="Oneida"/>
-                <a:ea typeface="Noto Sans CJK SC Regular"/>
-              </a:rPr>
-              <a:t> o=n^ tsi&gt; n@hte&gt; oh&lt;=t&amp; </a:t>
+              <a:t>Ta= aeswatahuhsiy%ste&gt; o=n^ tsi&gt; n@hte&gt; oh&lt;=t&amp; </a:t>
             </a:r>
             <a:r>
               <a:rPr b="0" i="1" lang="en-US" sz="3200" spc="-1" strike="noStrike">
@@ -1816,24 +3304,17 @@
                 <a:latin typeface="Oneida"/>
                 <a:ea typeface="Noto Sans CJK SC Regular"/>
               </a:rPr>
-              <a:t>yolihwat#htu&gt;</a:t>
+              <a:t>yolihwat#htu&gt; </a:t>
             </a:r>
-            <a:r>
-              <a:rPr b="0" i="1" lang="en-US" sz="3200" spc="-1" strike="noStrike">
-                <a:latin typeface="Oneida"/>
-                <a:ea typeface="Noto Sans CJK SC Regular"/>
-              </a:rPr>
-              <a:t> </a:t>
-            </a:r>
-            <a:endParaRPr b="0" i="1" lang="en-US" sz="3200" spc="-1" strike="noStrike">
-              <a:latin typeface="Oneida"/>
+            <a:endParaRPr b="0" lang="en-US" sz="3200" spc="-1" strike="noStrike">
+              <a:latin typeface="Arial"/>
             </a:endParaRPr>
           </a:p>
         </p:txBody>
       </p:sp>
       <p:pic>
         <p:nvPicPr>
-          <p:cNvPr id="43" name="" descr=""/>
+          <p:cNvPr id="78" name="" descr=""/>
           <p:cNvPicPr/>
           <p:nvPr/>
         </p:nvPicPr>
@@ -1844,7 +3325,7 @@
         <p:spPr>
           <a:xfrm>
             <a:off x="7422120" y="381240"/>
-            <a:ext cx="1904760" cy="1904760"/>
+            <a:ext cx="1904400" cy="1904400"/>
           </a:xfrm>
           <a:prstGeom prst="rect">
             <a:avLst/>
@@ -1905,14 +3386,14 @@
       </p:grpSpPr>
       <p:sp>
         <p:nvSpPr>
-          <p:cNvPr id="44" name="TextShape 1"/>
-          <p:cNvSpPr txBox="1"/>
+          <p:cNvPr id="79" name="CustomShape 1"/>
+          <p:cNvSpPr/>
           <p:nvPr/>
         </p:nvSpPr>
         <p:spPr>
           <a:xfrm>
             <a:off x="504000" y="301320"/>
-            <a:ext cx="9071640" cy="1262160"/>
+            <a:ext cx="9071280" cy="1261800"/>
           </a:xfrm>
           <a:prstGeom prst="rect">
             <a:avLst/>
@@ -1922,10 +3403,20 @@
             <a:noFill/>
           </a:ln>
         </p:spPr>
+        <p:style>
+          <a:lnRef idx="0"/>
+          <a:fillRef idx="0"/>
+          <a:effectRef idx="0"/>
+          <a:fontRef idx="minor"/>
+        </p:style>
         <p:txBody>
           <a:bodyPr lIns="0" rIns="0" tIns="0" bIns="0" anchor="ctr"/>
           <a:p>
-            <a:pPr algn="ctr"/>
+            <a:pPr algn="ctr">
+              <a:lnSpc>
+                <a:spcPct val="100000"/>
+              </a:lnSpc>
+            </a:pPr>
             <a:r>
               <a:rPr b="0" lang="en-US" sz="4800" spc="-1" strike="noStrike">
                 <a:latin typeface="Oneida"/>
@@ -1942,21 +3433,21 @@
               <a:t>e&gt;</a:t>
             </a:r>
             <a:endParaRPr b="0" lang="en-US" sz="4800" spc="-1" strike="noStrike">
-              <a:latin typeface="Oneida"/>
-            </a:endParaRPr>
-          </a:p>
-        </p:txBody>
-      </p:sp>
-      <p:sp>
-        <p:nvSpPr>
-          <p:cNvPr id="45" name="TextShape 2"/>
-          <p:cNvSpPr txBox="1"/>
+              <a:latin typeface="Arial"/>
+            </a:endParaRPr>
+          </a:p>
+        </p:txBody>
+      </p:sp>
+      <p:sp>
+        <p:nvSpPr>
+          <p:cNvPr id="80" name="CustomShape 2"/>
+          <p:cNvSpPr/>
           <p:nvPr/>
         </p:nvSpPr>
         <p:spPr>
           <a:xfrm>
             <a:off x="504000" y="1769040"/>
-            <a:ext cx="9071640" cy="4384440"/>
+            <a:ext cx="9071280" cy="4384080"/>
           </a:xfrm>
           <a:prstGeom prst="rect">
             <a:avLst/>
@@ -1966,6 +3457,12 @@
             <a:noFill/>
           </a:ln>
         </p:spPr>
+        <p:style>
+          <a:lnRef idx="0"/>
+          <a:fillRef idx="0"/>
+          <a:effectRef idx="0"/>
+          <a:fontRef idx="minor"/>
+        </p:style>
         <p:txBody>
           <a:bodyPr lIns="0" rIns="0" tIns="0" bIns="0">
             <a:normAutofit/>
@@ -1978,7 +3475,7 @@
               <a:t>Ta= aesw#lheke&gt; k&lt;ty%kwa&gt; n#= tho niyo=l#= wa&gt;kkwe=n$= n#= kanehelat&amp;ksla.</a:t>
             </a:r>
             <a:endParaRPr b="0" lang="en-US" sz="1600" spc="-1" strike="noStrike">
-              <a:latin typeface="Oneida"/>
+              <a:latin typeface="Arial"/>
             </a:endParaRPr>
           </a:p>
           <a:p>
@@ -1996,7 +3493,7 @@
               <a:t>$=</a:t>
             </a:r>
             <a:endParaRPr b="0" lang="en-US" sz="1600" spc="-1" strike="noStrike">
-              <a:latin typeface="Oneida"/>
+              <a:latin typeface="Arial"/>
             </a:endParaRPr>
           </a:p>
           <a:p>
@@ -2020,14 +3517,14 @@
               <a:t>.  T@ne&gt; tho.</a:t>
             </a:r>
             <a:endParaRPr b="0" lang="en-US" sz="1600" spc="-1" strike="noStrike">
-              <a:latin typeface="Oneida"/>
+              <a:latin typeface="Arial"/>
             </a:endParaRPr>
           </a:p>
         </p:txBody>
       </p:sp>
       <p:pic>
         <p:nvPicPr>
-          <p:cNvPr id="46" name="" descr=""/>
+          <p:cNvPr id="81" name="" descr=""/>
           <p:cNvPicPr/>
           <p:nvPr/>
         </p:nvPicPr>
@@ -2038,7 +3535,7 @@
         <p:spPr>
           <a:xfrm>
             <a:off x="4213440" y="3313080"/>
-            <a:ext cx="1695240" cy="971280"/>
+            <a:ext cx="1694880" cy="970920"/>
           </a:xfrm>
           <a:prstGeom prst="rect">
             <a:avLst/>
@@ -2301,4 +3798,227 @@
     </a:fmtScheme>
   </a:themeElements>
 </a:theme>
+</file>
+
+<file path=ppt/theme/theme2.xml><?xml version="1.0" encoding="utf-8"?>
+<a:theme xmlns:a="http://schemas.openxmlformats.org/drawingml/2006/main" name="Office Theme">
+  <a:themeElements>
+    <a:clrScheme name="Office">
+      <a:dk1>
+        <a:sysClr val="windowText" lastClr="000000"/>
+      </a:dk1>
+      <a:lt1>
+        <a:sysClr val="window" lastClr="FFFFFF"/>
+      </a:lt1>
+      <a:dk2>
+        <a:srgbClr val="1F497D"/>
+      </a:dk2>
+      <a:lt2>
+        <a:srgbClr val="EEECE1"/>
+      </a:lt2>
+      <a:accent1>
+        <a:srgbClr val="4F81BD"/>
+      </a:accent1>
+      <a:accent2>
+        <a:srgbClr val="C0504D"/>
+      </a:accent2>
+      <a:accent3>
+        <a:srgbClr val="9BBB59"/>
+      </a:accent3>
+      <a:accent4>
+        <a:srgbClr val="8064A2"/>
+      </a:accent4>
+      <a:accent5>
+        <a:srgbClr val="4BACC6"/>
+      </a:accent5>
+      <a:accent6>
+        <a:srgbClr val="F79646"/>
+      </a:accent6>
+      <a:hlink>
+        <a:srgbClr val="0000FF"/>
+      </a:hlink>
+      <a:folHlink>
+        <a:srgbClr val="800080"/>
+      </a:folHlink>
+    </a:clrScheme>
+    <a:fontScheme name="Office">
+      <a:majorFont>
+        <a:latin typeface="Arial"/>
+        <a:ea typeface="DejaVu Sans"/>
+        <a:cs typeface="DejaVu Sans"/>
+      </a:majorFont>
+      <a:minorFont>
+        <a:latin typeface="Arial"/>
+        <a:ea typeface="DejaVu Sans"/>
+        <a:cs typeface="DejaVu Sans"/>
+      </a:minorFont>
+    </a:fontScheme>
+    <a:fmtScheme name="Office">
+      <a:fillStyleLst>
+        <a:solidFill>
+          <a:schemeClr val="phClr"/>
+        </a:solidFill>
+        <a:gradFill rotWithShape="1">
+          <a:gsLst>
+            <a:gs pos="0">
+              <a:schemeClr val="phClr">
+                <a:tint val="50000"/>
+                <a:satMod val="300000"/>
+              </a:schemeClr>
+            </a:gs>
+            <a:gs pos="35000">
+              <a:schemeClr val="phClr">
+                <a:tint val="37000"/>
+                <a:satMod val="300000"/>
+              </a:schemeClr>
+            </a:gs>
+            <a:gs pos="100000">
+              <a:schemeClr val="phClr">
+                <a:tint val="15000"/>
+                <a:satMod val="350000"/>
+              </a:schemeClr>
+            </a:gs>
+          </a:gsLst>
+          <a:lin ang="16200000" scaled="1"/>
+        </a:gradFill>
+        <a:gradFill rotWithShape="1">
+          <a:gsLst>
+            <a:gs pos="0">
+              <a:schemeClr val="phClr">
+                <a:shade val="51000"/>
+                <a:satMod val="130000"/>
+              </a:schemeClr>
+            </a:gs>
+            <a:gs pos="80000">
+              <a:schemeClr val="phClr">
+                <a:shade val="93000"/>
+                <a:satMod val="130000"/>
+              </a:schemeClr>
+            </a:gs>
+            <a:gs pos="100000">
+              <a:schemeClr val="phClr">
+                <a:shade val="94000"/>
+                <a:satMod val="135000"/>
+              </a:schemeClr>
+            </a:gs>
+          </a:gsLst>
+          <a:lin ang="16200000" scaled="0"/>
+        </a:gradFill>
+      </a:fillStyleLst>
+      <a:lnStyleLst>
+        <a:ln w="9525" cap="flat" cmpd="sng" algn="ctr">
+          <a:solidFill>
+            <a:schemeClr val="phClr">
+              <a:shade val="95000"/>
+              <a:satMod val="105000"/>
+            </a:schemeClr>
+          </a:solidFill>
+          <a:prstDash val="solid"/>
+        </a:ln>
+        <a:ln w="25400" cap="flat" cmpd="sng" algn="ctr">
+          <a:solidFill>
+            <a:schemeClr val="phClr"/>
+          </a:solidFill>
+          <a:prstDash val="solid"/>
+        </a:ln>
+        <a:ln w="38100" cap="flat" cmpd="sng" algn="ctr">
+          <a:solidFill>
+            <a:schemeClr val="phClr"/>
+          </a:solidFill>
+          <a:prstDash val="solid"/>
+        </a:ln>
+      </a:lnStyleLst>
+      <a:effectStyleLst>
+        <a:effectStyle>
+          <a:effectLst>
+            <a:outerShdw blurRad="40000" dist="20000" dir="5400000" rotWithShape="0">
+              <a:srgbClr val="000000">
+                <a:alpha val="38000"/>
+              </a:srgbClr>
+            </a:outerShdw>
+          </a:effectLst>
+        </a:effectStyle>
+        <a:effectStyle>
+          <a:effectLst>
+            <a:outerShdw blurRad="40000" dist="23000" dir="5400000" rotWithShape="0">
+              <a:srgbClr val="000000">
+                <a:alpha val="35000"/>
+              </a:srgbClr>
+            </a:outerShdw>
+          </a:effectLst>
+        </a:effectStyle>
+        <a:effectStyle>
+          <a:effectLst>
+            <a:outerShdw blurRad="40000" dist="23000" dir="5400000" rotWithShape="0">
+              <a:srgbClr val="000000">
+                <a:alpha val="35000"/>
+              </a:srgbClr>
+            </a:outerShdw>
+          </a:effectLst>
+          <a:scene3d>
+            <a:camera prst="orthographicFront">
+              <a:rot lat="0" lon="0" rev="0"/>
+            </a:camera>
+            <a:lightRig rig="threePt" dir="t">
+              <a:rot lat="0" lon="0" rev="1200000"/>
+            </a:lightRig>
+          </a:scene3d>
+          <a:sp3d>
+            <a:bevelT w="63500" h="25400"/>
+          </a:sp3d>
+        </a:effectStyle>
+      </a:effectStyleLst>
+      <a:bgFillStyleLst>
+        <a:solidFill>
+          <a:schemeClr val="phClr"/>
+        </a:solidFill>
+        <a:gradFill rotWithShape="1">
+          <a:gsLst>
+            <a:gs pos="0">
+              <a:schemeClr val="phClr">
+                <a:tint val="40000"/>
+                <a:satMod val="350000"/>
+              </a:schemeClr>
+            </a:gs>
+            <a:gs pos="40000">
+              <a:schemeClr val="phClr">
+                <a:tint val="45000"/>
+                <a:shade val="99000"/>
+                <a:satMod val="350000"/>
+              </a:schemeClr>
+            </a:gs>
+            <a:gs pos="100000">
+              <a:schemeClr val="phClr">
+                <a:shade val="20000"/>
+                <a:satMod val="255000"/>
+              </a:schemeClr>
+            </a:gs>
+          </a:gsLst>
+          <a:path path="circle">
+            <a:fillToRect l="50000" t="-80000" r="50000" b="180000"/>
+          </a:path>
+        </a:gradFill>
+        <a:gradFill rotWithShape="1">
+          <a:gsLst>
+            <a:gs pos="0">
+              <a:schemeClr val="phClr">
+                <a:tint val="80000"/>
+                <a:satMod val="300000"/>
+              </a:schemeClr>
+            </a:gs>
+            <a:gs pos="100000">
+              <a:schemeClr val="phClr">
+                <a:shade val="30000"/>
+                <a:satMod val="200000"/>
+              </a:schemeClr>
+            </a:gs>
+          </a:gsLst>
+          <a:path path="circle">
+            <a:fillToRect l="50000" t="50000" r="50000" b="50000"/>
+          </a:path>
+        </a:gradFill>
+      </a:bgFillStyleLst>
+    </a:fmtScheme>
+  </a:themeElements>
+</a:theme>
 </file>
</xml_diff>